<commit_message>
adds XSD topic to lec slide
</commit_message>
<xml_diff>
--- a/Slides/Ders 1.pptx
+++ b/Slides/Ders 1.pptx
@@ -5,7 +5,7 @@
     <p:sldMasterId id="2147483660" r:id="rId1"/>
   </p:sldMasterIdLst>
   <p:notesMasterIdLst>
-    <p:notesMasterId r:id="rId16"/>
+    <p:notesMasterId r:id="rId19"/>
   </p:notesMasterIdLst>
   <p:sldIdLst>
     <p:sldId id="256" r:id="rId2"/>
@@ -22,6 +22,9 @@
     <p:sldId id="267" r:id="rId13"/>
     <p:sldId id="268" r:id="rId14"/>
     <p:sldId id="269" r:id="rId15"/>
+    <p:sldId id="271" r:id="rId16"/>
+    <p:sldId id="270" r:id="rId17"/>
+    <p:sldId id="272" r:id="rId18"/>
   </p:sldIdLst>
   <p:sldSz cx="9144000" cy="6858000" type="screen4x3"/>
   <p:notesSz cx="6858000" cy="9144000"/>
@@ -4467,6 +4470,1168 @@
     <p:extLst>
       <p:ext uri="{BB962C8B-B14F-4D97-AF65-F5344CB8AC3E}">
         <p14:creationId xmlns:p14="http://schemas.microsoft.com/office/powerpoint/2010/main" val="1566858748"/>
+      </p:ext>
+    </p:extLst>
+  </p:cSld>
+  <p:clrMapOvr>
+    <a:masterClrMapping/>
+  </p:clrMapOvr>
+</p:sld>
+</file>
+
+<file path=ppt/slides/slide15.xml><?xml version="1.0" encoding="utf-8"?>
+<p:sld xmlns:a="http://schemas.openxmlformats.org/drawingml/2006/main" xmlns:r="http://schemas.openxmlformats.org/officeDocument/2006/relationships" xmlns:p="http://schemas.openxmlformats.org/presentationml/2006/main">
+  <p:cSld>
+    <p:spTree>
+      <p:nvGrpSpPr>
+        <p:cNvPr id="1" name=""/>
+        <p:cNvGrpSpPr/>
+        <p:nvPr/>
+      </p:nvGrpSpPr>
+      <p:grpSpPr>
+        <a:xfrm>
+          <a:off x="0" y="0"/>
+          <a:ext cx="0" cy="0"/>
+          <a:chOff x="0" y="0"/>
+          <a:chExt cx="0" cy="0"/>
+        </a:xfrm>
+      </p:grpSpPr>
+      <p:sp>
+        <p:nvSpPr>
+          <p:cNvPr id="2" name="Title 1">
+            <a:extLst>
+              <a:ext uri="{FF2B5EF4-FFF2-40B4-BE49-F238E27FC236}">
+                <a16:creationId xmlns:a16="http://schemas.microsoft.com/office/drawing/2014/main" id="{2E2D751F-B02E-3E2A-2F45-FDFAFCE8D00D}"/>
+              </a:ext>
+            </a:extLst>
+          </p:cNvPr>
+          <p:cNvSpPr>
+            <a:spLocks noGrp="1"/>
+          </p:cNvSpPr>
+          <p:nvPr>
+            <p:ph type="title"/>
+          </p:nvPr>
+        </p:nvSpPr>
+        <p:spPr/>
+        <p:txBody>
+          <a:bodyPr/>
+          <a:lstStyle/>
+          <a:p>
+            <a:r>
+              <a:rPr lang="tr-TR" dirty="0"/>
+              <a:t>XML Şeması (XSD)</a:t>
+            </a:r>
+          </a:p>
+        </p:txBody>
+      </p:sp>
+      <p:sp>
+        <p:nvSpPr>
+          <p:cNvPr id="3" name="Content Placeholder 2">
+            <a:extLst>
+              <a:ext uri="{FF2B5EF4-FFF2-40B4-BE49-F238E27FC236}">
+                <a16:creationId xmlns:a16="http://schemas.microsoft.com/office/drawing/2014/main" id="{DFD8D7A2-6829-0FB7-00F3-63141498B311}"/>
+              </a:ext>
+            </a:extLst>
+          </p:cNvPr>
+          <p:cNvSpPr>
+            <a:spLocks noGrp="1"/>
+          </p:cNvSpPr>
+          <p:nvPr>
+            <p:ph idx="1"/>
+          </p:nvPr>
+        </p:nvSpPr>
+        <p:spPr/>
+        <p:txBody>
+          <a:bodyPr>
+            <a:normAutofit lnSpcReduction="10000"/>
+          </a:bodyPr>
+          <a:lstStyle/>
+          <a:p>
+            <a:r>
+              <a:rPr lang="tr-TR" dirty="0"/>
+              <a:t>Bir XML Şeması, tıpkı bir DTD gibi bir XML belgesinin yapısını tanımlar.</a:t>
+            </a:r>
+          </a:p>
+          <a:p>
+            <a:endParaRPr lang="tr-TR" dirty="0"/>
+          </a:p>
+          <a:p>
+            <a:r>
+              <a:rPr lang="tr-TR" dirty="0"/>
+              <a:t>Doğru sözdizimine (sentaks) sahip bir XML belgesine "İyi Biçimlendirilmiş" denir.</a:t>
+            </a:r>
+          </a:p>
+          <a:p>
+            <a:endParaRPr lang="tr-TR" dirty="0"/>
+          </a:p>
+          <a:p>
+            <a:r>
+              <a:rPr lang="tr-TR" dirty="0"/>
+              <a:t>Bir XML Şemasına göre doğrulanan bir XML belgesi hem "İyi Biçimlendirilmiş" hem de "Geçerlidir".</a:t>
+            </a:r>
+          </a:p>
+          <a:p>
+            <a:endParaRPr lang="tr-TR" dirty="0"/>
+          </a:p>
+          <a:p>
+            <a:r>
+              <a:rPr lang="tr-TR" dirty="0"/>
+              <a:t>XML Şeması, </a:t>
+            </a:r>
+            <a:r>
+              <a:rPr lang="tr-TR" dirty="0" err="1"/>
+              <a:t>DTD'ye</a:t>
+            </a:r>
+            <a:r>
+              <a:rPr lang="tr-TR" dirty="0"/>
+              <a:t> XML tabanlı bir alternatiftir.</a:t>
+            </a:r>
+          </a:p>
+        </p:txBody>
+      </p:sp>
+      <p:sp>
+        <p:nvSpPr>
+          <p:cNvPr id="4" name="TextBox 3">
+            <a:extLst>
+              <a:ext uri="{FF2B5EF4-FFF2-40B4-BE49-F238E27FC236}">
+                <a16:creationId xmlns:a16="http://schemas.microsoft.com/office/drawing/2014/main" id="{5F979720-6924-0514-A193-014750BC0C1C}"/>
+              </a:ext>
+            </a:extLst>
+          </p:cNvPr>
+          <p:cNvSpPr txBox="1"/>
+          <p:nvPr/>
+        </p:nvSpPr>
+        <p:spPr>
+          <a:xfrm>
+            <a:off x="628650" y="6192837"/>
+            <a:ext cx="4945328" cy="369332"/>
+          </a:xfrm>
+          <a:prstGeom prst="rect">
+            <a:avLst/>
+          </a:prstGeom>
+          <a:noFill/>
+        </p:spPr>
+        <p:txBody>
+          <a:bodyPr wrap="none" rtlCol="0">
+            <a:spAutoFit/>
+          </a:bodyPr>
+          <a:lstStyle/>
+          <a:p>
+            <a:r>
+              <a:rPr lang="tr-TR" dirty="0" err="1"/>
+              <a:t>https</a:t>
+            </a:r>
+            <a:r>
+              <a:rPr lang="tr-TR" dirty="0"/>
+              <a:t>://www.w3schools.com/</a:t>
+            </a:r>
+            <a:r>
+              <a:rPr lang="tr-TR" dirty="0" err="1"/>
+              <a:t>xml</a:t>
+            </a:r>
+            <a:r>
+              <a:rPr lang="tr-TR" dirty="0"/>
+              <a:t>/</a:t>
+            </a:r>
+            <a:r>
+              <a:rPr lang="tr-TR" dirty="0" err="1"/>
+              <a:t>xml_schema.asp</a:t>
+            </a:r>
+            <a:endParaRPr lang="tr-TR" dirty="0"/>
+          </a:p>
+        </p:txBody>
+      </p:sp>
+    </p:spTree>
+    <p:extLst>
+      <p:ext uri="{BB962C8B-B14F-4D97-AF65-F5344CB8AC3E}">
+        <p14:creationId xmlns:p14="http://schemas.microsoft.com/office/powerpoint/2010/main" val="1045859140"/>
+      </p:ext>
+    </p:extLst>
+  </p:cSld>
+  <p:clrMapOvr>
+    <a:masterClrMapping/>
+  </p:clrMapOvr>
+</p:sld>
+</file>
+
+<file path=ppt/slides/slide16.xml><?xml version="1.0" encoding="utf-8"?>
+<p:sld xmlns:a="http://schemas.openxmlformats.org/drawingml/2006/main" xmlns:r="http://schemas.openxmlformats.org/officeDocument/2006/relationships" xmlns:p="http://schemas.openxmlformats.org/presentationml/2006/main">
+  <p:cSld>
+    <p:spTree>
+      <p:nvGrpSpPr>
+        <p:cNvPr id="1" name=""/>
+        <p:cNvGrpSpPr/>
+        <p:nvPr/>
+      </p:nvGrpSpPr>
+      <p:grpSpPr>
+        <a:xfrm>
+          <a:off x="0" y="0"/>
+          <a:ext cx="0" cy="0"/>
+          <a:chOff x="0" y="0"/>
+          <a:chExt cx="0" cy="0"/>
+        </a:xfrm>
+      </p:grpSpPr>
+      <p:sp>
+        <p:nvSpPr>
+          <p:cNvPr id="2" name="Title 1">
+            <a:extLst>
+              <a:ext uri="{FF2B5EF4-FFF2-40B4-BE49-F238E27FC236}">
+                <a16:creationId xmlns:a16="http://schemas.microsoft.com/office/drawing/2014/main" id="{2E2D751F-B02E-3E2A-2F45-FDFAFCE8D00D}"/>
+              </a:ext>
+            </a:extLst>
+          </p:cNvPr>
+          <p:cNvSpPr>
+            <a:spLocks noGrp="1"/>
+          </p:cNvSpPr>
+          <p:nvPr>
+            <p:ph type="title"/>
+          </p:nvPr>
+        </p:nvSpPr>
+        <p:spPr/>
+        <p:txBody>
+          <a:bodyPr/>
+          <a:lstStyle/>
+          <a:p>
+            <a:r>
+              <a:rPr lang="tr-TR" dirty="0"/>
+              <a:t>XSD</a:t>
+            </a:r>
+          </a:p>
+        </p:txBody>
+      </p:sp>
+      <p:sp>
+        <p:nvSpPr>
+          <p:cNvPr id="3" name="Content Placeholder 2">
+            <a:extLst>
+              <a:ext uri="{FF2B5EF4-FFF2-40B4-BE49-F238E27FC236}">
+                <a16:creationId xmlns:a16="http://schemas.microsoft.com/office/drawing/2014/main" id="{DFD8D7A2-6829-0FB7-00F3-63141498B311}"/>
+              </a:ext>
+            </a:extLst>
+          </p:cNvPr>
+          <p:cNvSpPr>
+            <a:spLocks noGrp="1"/>
+          </p:cNvSpPr>
+          <p:nvPr>
+            <p:ph idx="1"/>
+          </p:nvPr>
+        </p:nvSpPr>
+        <p:spPr/>
+        <p:txBody>
+          <a:bodyPr>
+            <a:normAutofit/>
+          </a:bodyPr>
+          <a:lstStyle/>
+          <a:p>
+            <a:pPr marL="0" indent="0">
+              <a:buNone/>
+            </a:pPr>
+            <a:r>
+              <a:rPr lang="en-US" sz="2000" b="0" i="0" u="none" strike="noStrike" dirty="0">
+                <a:solidFill>
+                  <a:srgbClr val="0000CD"/>
+                </a:solidFill>
+                <a:effectLst/>
+                <a:latin typeface="Consolas" panose="020B0609020204030204" pitchFamily="49" charset="0"/>
+              </a:rPr>
+              <a:t>&lt;</a:t>
+            </a:r>
+            <a:r>
+              <a:rPr lang="en-US" sz="2000" b="0" i="0" u="none" strike="noStrike" dirty="0" err="1">
+                <a:solidFill>
+                  <a:srgbClr val="A52A2A"/>
+                </a:solidFill>
+                <a:effectLst/>
+                <a:latin typeface="Consolas" panose="020B0609020204030204" pitchFamily="49" charset="0"/>
+              </a:rPr>
+              <a:t>xs:element</a:t>
+            </a:r>
+            <a:r>
+              <a:rPr lang="en-US" sz="2000" b="0" i="0" u="none" strike="noStrike" dirty="0">
+                <a:solidFill>
+                  <a:srgbClr val="FF0000"/>
+                </a:solidFill>
+                <a:effectLst/>
+                <a:latin typeface="Consolas" panose="020B0609020204030204" pitchFamily="49" charset="0"/>
+              </a:rPr>
+              <a:t> name</a:t>
+            </a:r>
+            <a:r>
+              <a:rPr lang="en-US" sz="2000" b="0" i="0" u="none" strike="noStrike" dirty="0">
+                <a:solidFill>
+                  <a:srgbClr val="0000CD"/>
+                </a:solidFill>
+                <a:effectLst/>
+                <a:latin typeface="Consolas" panose="020B0609020204030204" pitchFamily="49" charset="0"/>
+              </a:rPr>
+              <a:t>="note"&gt;</a:t>
+            </a:r>
+            <a:br>
+              <a:rPr lang="en-US" sz="2000" dirty="0"/>
+            </a:br>
+            <a:br>
+              <a:rPr lang="en-US" sz="2000" dirty="0"/>
+            </a:br>
+            <a:r>
+              <a:rPr lang="en-US" sz="2000" b="0" i="0" u="none" strike="noStrike" dirty="0">
+                <a:solidFill>
+                  <a:srgbClr val="0000CD"/>
+                </a:solidFill>
+                <a:effectLst/>
+                <a:latin typeface="Consolas" panose="020B0609020204030204" pitchFamily="49" charset="0"/>
+              </a:rPr>
+              <a:t>&lt;</a:t>
+            </a:r>
+            <a:r>
+              <a:rPr lang="en-US" sz="2000" b="0" i="0" u="none" strike="noStrike" dirty="0" err="1">
+                <a:solidFill>
+                  <a:srgbClr val="A52A2A"/>
+                </a:solidFill>
+                <a:effectLst/>
+                <a:latin typeface="Consolas" panose="020B0609020204030204" pitchFamily="49" charset="0"/>
+              </a:rPr>
+              <a:t>xs:complexType</a:t>
+            </a:r>
+            <a:r>
+              <a:rPr lang="en-US" sz="2000" b="0" i="0" u="none" strike="noStrike" dirty="0">
+                <a:solidFill>
+                  <a:srgbClr val="0000CD"/>
+                </a:solidFill>
+                <a:effectLst/>
+                <a:latin typeface="Consolas" panose="020B0609020204030204" pitchFamily="49" charset="0"/>
+              </a:rPr>
+              <a:t>&gt;</a:t>
+            </a:r>
+            <a:br>
+              <a:rPr lang="en-US" sz="2000" dirty="0"/>
+            </a:br>
+            <a:r>
+              <a:rPr lang="en-US" sz="2000" b="0" i="0" u="none" strike="noStrike" dirty="0">
+                <a:solidFill>
+                  <a:srgbClr val="000000"/>
+                </a:solidFill>
+                <a:effectLst/>
+                <a:latin typeface="Consolas" panose="020B0609020204030204" pitchFamily="49" charset="0"/>
+              </a:rPr>
+              <a:t>  </a:t>
+            </a:r>
+            <a:r>
+              <a:rPr lang="en-US" sz="2000" b="0" i="0" u="none" strike="noStrike" dirty="0">
+                <a:solidFill>
+                  <a:srgbClr val="0000CD"/>
+                </a:solidFill>
+                <a:effectLst/>
+                <a:latin typeface="Consolas" panose="020B0609020204030204" pitchFamily="49" charset="0"/>
+              </a:rPr>
+              <a:t>&lt;</a:t>
+            </a:r>
+            <a:r>
+              <a:rPr lang="en-US" sz="2000" b="0" i="0" u="none" strike="noStrike" dirty="0" err="1">
+                <a:solidFill>
+                  <a:srgbClr val="A52A2A"/>
+                </a:solidFill>
+                <a:effectLst/>
+                <a:latin typeface="Consolas" panose="020B0609020204030204" pitchFamily="49" charset="0"/>
+              </a:rPr>
+              <a:t>xs:sequence</a:t>
+            </a:r>
+            <a:r>
+              <a:rPr lang="en-US" sz="2000" b="0" i="0" u="none" strike="noStrike" dirty="0">
+                <a:solidFill>
+                  <a:srgbClr val="0000CD"/>
+                </a:solidFill>
+                <a:effectLst/>
+                <a:latin typeface="Consolas" panose="020B0609020204030204" pitchFamily="49" charset="0"/>
+              </a:rPr>
+              <a:t>&gt;</a:t>
+            </a:r>
+            <a:br>
+              <a:rPr lang="en-US" sz="2000" dirty="0"/>
+            </a:br>
+            <a:r>
+              <a:rPr lang="en-US" sz="2000" b="0" i="0" u="none" strike="noStrike" dirty="0">
+                <a:solidFill>
+                  <a:srgbClr val="000000"/>
+                </a:solidFill>
+                <a:effectLst/>
+                <a:latin typeface="Consolas" panose="020B0609020204030204" pitchFamily="49" charset="0"/>
+              </a:rPr>
+              <a:t>    </a:t>
+            </a:r>
+            <a:r>
+              <a:rPr lang="en-US" sz="2000" b="0" i="0" u="none" strike="noStrike" dirty="0">
+                <a:solidFill>
+                  <a:srgbClr val="0000CD"/>
+                </a:solidFill>
+                <a:effectLst/>
+                <a:latin typeface="Consolas" panose="020B0609020204030204" pitchFamily="49" charset="0"/>
+              </a:rPr>
+              <a:t>&lt;</a:t>
+            </a:r>
+            <a:r>
+              <a:rPr lang="en-US" sz="2000" b="0" i="0" u="none" strike="noStrike" dirty="0" err="1">
+                <a:solidFill>
+                  <a:srgbClr val="A52A2A"/>
+                </a:solidFill>
+                <a:effectLst/>
+                <a:latin typeface="Consolas" panose="020B0609020204030204" pitchFamily="49" charset="0"/>
+              </a:rPr>
+              <a:t>xs:element</a:t>
+            </a:r>
+            <a:r>
+              <a:rPr lang="en-US" sz="2000" b="0" i="0" u="none" strike="noStrike" dirty="0">
+                <a:solidFill>
+                  <a:srgbClr val="FF0000"/>
+                </a:solidFill>
+                <a:effectLst/>
+                <a:latin typeface="Consolas" panose="020B0609020204030204" pitchFamily="49" charset="0"/>
+              </a:rPr>
+              <a:t> name</a:t>
+            </a:r>
+            <a:r>
+              <a:rPr lang="en-US" sz="2000" b="0" i="0" u="none" strike="noStrike" dirty="0">
+                <a:solidFill>
+                  <a:srgbClr val="0000CD"/>
+                </a:solidFill>
+                <a:effectLst/>
+                <a:latin typeface="Consolas" panose="020B0609020204030204" pitchFamily="49" charset="0"/>
+              </a:rPr>
+              <a:t>="to"</a:t>
+            </a:r>
+            <a:r>
+              <a:rPr lang="en-US" sz="2000" b="0" i="0" u="none" strike="noStrike" dirty="0">
+                <a:solidFill>
+                  <a:srgbClr val="FF0000"/>
+                </a:solidFill>
+                <a:effectLst/>
+                <a:latin typeface="Consolas" panose="020B0609020204030204" pitchFamily="49" charset="0"/>
+              </a:rPr>
+              <a:t> type</a:t>
+            </a:r>
+            <a:r>
+              <a:rPr lang="en-US" sz="2000" b="0" i="0" u="none" strike="noStrike" dirty="0">
+                <a:solidFill>
+                  <a:srgbClr val="0000CD"/>
+                </a:solidFill>
+                <a:effectLst/>
+                <a:latin typeface="Consolas" panose="020B0609020204030204" pitchFamily="49" charset="0"/>
+              </a:rPr>
+              <a:t>="</a:t>
+            </a:r>
+            <a:r>
+              <a:rPr lang="en-US" sz="2000" b="0" i="0" u="none" strike="noStrike" dirty="0" err="1">
+                <a:solidFill>
+                  <a:srgbClr val="0000CD"/>
+                </a:solidFill>
+                <a:effectLst/>
+                <a:latin typeface="Consolas" panose="020B0609020204030204" pitchFamily="49" charset="0"/>
+              </a:rPr>
+              <a:t>xs:string</a:t>
+            </a:r>
+            <a:r>
+              <a:rPr lang="en-US" sz="2000" b="0" i="0" u="none" strike="noStrike" dirty="0">
+                <a:solidFill>
+                  <a:srgbClr val="0000CD"/>
+                </a:solidFill>
+                <a:effectLst/>
+                <a:latin typeface="Consolas" panose="020B0609020204030204" pitchFamily="49" charset="0"/>
+              </a:rPr>
+              <a:t>"</a:t>
+            </a:r>
+            <a:r>
+              <a:rPr lang="en-US" sz="2000" b="0" i="0" u="none" strike="noStrike" dirty="0">
+                <a:solidFill>
+                  <a:srgbClr val="FF0000"/>
+                </a:solidFill>
+                <a:effectLst/>
+                <a:latin typeface="Consolas" panose="020B0609020204030204" pitchFamily="49" charset="0"/>
+              </a:rPr>
+              <a:t>/</a:t>
+            </a:r>
+            <a:r>
+              <a:rPr lang="en-US" sz="2000" b="0" i="0" u="none" strike="noStrike" dirty="0">
+                <a:solidFill>
+                  <a:srgbClr val="0000CD"/>
+                </a:solidFill>
+                <a:effectLst/>
+                <a:latin typeface="Consolas" panose="020B0609020204030204" pitchFamily="49" charset="0"/>
+              </a:rPr>
+              <a:t>&gt;</a:t>
+            </a:r>
+            <a:br>
+              <a:rPr lang="en-US" sz="2000" dirty="0"/>
+            </a:br>
+            <a:r>
+              <a:rPr lang="en-US" sz="2000" b="0" i="0" u="none" strike="noStrike" dirty="0">
+                <a:solidFill>
+                  <a:srgbClr val="000000"/>
+                </a:solidFill>
+                <a:effectLst/>
+                <a:latin typeface="Consolas" panose="020B0609020204030204" pitchFamily="49" charset="0"/>
+              </a:rPr>
+              <a:t>    </a:t>
+            </a:r>
+            <a:r>
+              <a:rPr lang="en-US" sz="2000" b="0" i="0" u="none" strike="noStrike" dirty="0">
+                <a:solidFill>
+                  <a:srgbClr val="0000CD"/>
+                </a:solidFill>
+                <a:effectLst/>
+                <a:latin typeface="Consolas" panose="020B0609020204030204" pitchFamily="49" charset="0"/>
+              </a:rPr>
+              <a:t>&lt;</a:t>
+            </a:r>
+            <a:r>
+              <a:rPr lang="en-US" sz="2000" b="0" i="0" u="none" strike="noStrike" dirty="0" err="1">
+                <a:solidFill>
+                  <a:srgbClr val="A52A2A"/>
+                </a:solidFill>
+                <a:effectLst/>
+                <a:latin typeface="Consolas" panose="020B0609020204030204" pitchFamily="49" charset="0"/>
+              </a:rPr>
+              <a:t>xs:element</a:t>
+            </a:r>
+            <a:r>
+              <a:rPr lang="en-US" sz="2000" b="0" i="0" u="none" strike="noStrike" dirty="0">
+                <a:solidFill>
+                  <a:srgbClr val="FF0000"/>
+                </a:solidFill>
+                <a:effectLst/>
+                <a:latin typeface="Consolas" panose="020B0609020204030204" pitchFamily="49" charset="0"/>
+              </a:rPr>
+              <a:t> name</a:t>
+            </a:r>
+            <a:r>
+              <a:rPr lang="en-US" sz="2000" b="0" i="0" u="none" strike="noStrike" dirty="0">
+                <a:solidFill>
+                  <a:srgbClr val="0000CD"/>
+                </a:solidFill>
+                <a:effectLst/>
+                <a:latin typeface="Consolas" panose="020B0609020204030204" pitchFamily="49" charset="0"/>
+              </a:rPr>
+              <a:t>="from"</a:t>
+            </a:r>
+            <a:r>
+              <a:rPr lang="en-US" sz="2000" b="0" i="0" u="none" strike="noStrike" dirty="0">
+                <a:solidFill>
+                  <a:srgbClr val="FF0000"/>
+                </a:solidFill>
+                <a:effectLst/>
+                <a:latin typeface="Consolas" panose="020B0609020204030204" pitchFamily="49" charset="0"/>
+              </a:rPr>
+              <a:t> type</a:t>
+            </a:r>
+            <a:r>
+              <a:rPr lang="en-US" sz="2000" b="0" i="0" u="none" strike="noStrike" dirty="0">
+                <a:solidFill>
+                  <a:srgbClr val="0000CD"/>
+                </a:solidFill>
+                <a:effectLst/>
+                <a:latin typeface="Consolas" panose="020B0609020204030204" pitchFamily="49" charset="0"/>
+              </a:rPr>
+              <a:t>="</a:t>
+            </a:r>
+            <a:r>
+              <a:rPr lang="en-US" sz="2000" b="0" i="0" u="none" strike="noStrike" dirty="0" err="1">
+                <a:solidFill>
+                  <a:srgbClr val="0000CD"/>
+                </a:solidFill>
+                <a:effectLst/>
+                <a:latin typeface="Consolas" panose="020B0609020204030204" pitchFamily="49" charset="0"/>
+              </a:rPr>
+              <a:t>xs:string</a:t>
+            </a:r>
+            <a:r>
+              <a:rPr lang="en-US" sz="2000" b="0" i="0" u="none" strike="noStrike" dirty="0">
+                <a:solidFill>
+                  <a:srgbClr val="0000CD"/>
+                </a:solidFill>
+                <a:effectLst/>
+                <a:latin typeface="Consolas" panose="020B0609020204030204" pitchFamily="49" charset="0"/>
+              </a:rPr>
+              <a:t>"</a:t>
+            </a:r>
+            <a:r>
+              <a:rPr lang="en-US" sz="2000" b="0" i="0" u="none" strike="noStrike" dirty="0">
+                <a:solidFill>
+                  <a:srgbClr val="FF0000"/>
+                </a:solidFill>
+                <a:effectLst/>
+                <a:latin typeface="Consolas" panose="020B0609020204030204" pitchFamily="49" charset="0"/>
+              </a:rPr>
+              <a:t>/</a:t>
+            </a:r>
+            <a:r>
+              <a:rPr lang="en-US" sz="2000" b="0" i="0" u="none" strike="noStrike" dirty="0">
+                <a:solidFill>
+                  <a:srgbClr val="0000CD"/>
+                </a:solidFill>
+                <a:effectLst/>
+                <a:latin typeface="Consolas" panose="020B0609020204030204" pitchFamily="49" charset="0"/>
+              </a:rPr>
+              <a:t>&gt;</a:t>
+            </a:r>
+            <a:br>
+              <a:rPr lang="en-US" sz="2000" dirty="0"/>
+            </a:br>
+            <a:r>
+              <a:rPr lang="en-US" sz="2000" b="0" i="0" u="none" strike="noStrike" dirty="0">
+                <a:solidFill>
+                  <a:srgbClr val="000000"/>
+                </a:solidFill>
+                <a:effectLst/>
+                <a:latin typeface="Consolas" panose="020B0609020204030204" pitchFamily="49" charset="0"/>
+              </a:rPr>
+              <a:t>    </a:t>
+            </a:r>
+            <a:r>
+              <a:rPr lang="en-US" sz="2000" b="0" i="0" u="none" strike="noStrike" dirty="0">
+                <a:solidFill>
+                  <a:srgbClr val="0000CD"/>
+                </a:solidFill>
+                <a:effectLst/>
+                <a:latin typeface="Consolas" panose="020B0609020204030204" pitchFamily="49" charset="0"/>
+              </a:rPr>
+              <a:t>&lt;</a:t>
+            </a:r>
+            <a:r>
+              <a:rPr lang="en-US" sz="2000" b="0" i="0" u="none" strike="noStrike" dirty="0" err="1">
+                <a:solidFill>
+                  <a:srgbClr val="A52A2A"/>
+                </a:solidFill>
+                <a:effectLst/>
+                <a:latin typeface="Consolas" panose="020B0609020204030204" pitchFamily="49" charset="0"/>
+              </a:rPr>
+              <a:t>xs:element</a:t>
+            </a:r>
+            <a:r>
+              <a:rPr lang="en-US" sz="2000" b="0" i="0" u="none" strike="noStrike" dirty="0">
+                <a:solidFill>
+                  <a:srgbClr val="FF0000"/>
+                </a:solidFill>
+                <a:effectLst/>
+                <a:latin typeface="Consolas" panose="020B0609020204030204" pitchFamily="49" charset="0"/>
+              </a:rPr>
+              <a:t> name</a:t>
+            </a:r>
+            <a:r>
+              <a:rPr lang="en-US" sz="2000" b="0" i="0" u="none" strike="noStrike" dirty="0">
+                <a:solidFill>
+                  <a:srgbClr val="0000CD"/>
+                </a:solidFill>
+                <a:effectLst/>
+                <a:latin typeface="Consolas" panose="020B0609020204030204" pitchFamily="49" charset="0"/>
+              </a:rPr>
+              <a:t>="heading"</a:t>
+            </a:r>
+            <a:r>
+              <a:rPr lang="en-US" sz="2000" b="0" i="0" u="none" strike="noStrike" dirty="0">
+                <a:solidFill>
+                  <a:srgbClr val="FF0000"/>
+                </a:solidFill>
+                <a:effectLst/>
+                <a:latin typeface="Consolas" panose="020B0609020204030204" pitchFamily="49" charset="0"/>
+              </a:rPr>
+              <a:t> type</a:t>
+            </a:r>
+            <a:r>
+              <a:rPr lang="en-US" sz="2000" b="0" i="0" u="none" strike="noStrike" dirty="0">
+                <a:solidFill>
+                  <a:srgbClr val="0000CD"/>
+                </a:solidFill>
+                <a:effectLst/>
+                <a:latin typeface="Consolas" panose="020B0609020204030204" pitchFamily="49" charset="0"/>
+              </a:rPr>
+              <a:t>="</a:t>
+            </a:r>
+            <a:r>
+              <a:rPr lang="en-US" sz="2000" b="0" i="0" u="none" strike="noStrike" dirty="0" err="1">
+                <a:solidFill>
+                  <a:srgbClr val="0000CD"/>
+                </a:solidFill>
+                <a:effectLst/>
+                <a:latin typeface="Consolas" panose="020B0609020204030204" pitchFamily="49" charset="0"/>
+              </a:rPr>
+              <a:t>xs:string</a:t>
+            </a:r>
+            <a:r>
+              <a:rPr lang="en-US" sz="2000" b="0" i="0" u="none" strike="noStrike" dirty="0">
+                <a:solidFill>
+                  <a:srgbClr val="0000CD"/>
+                </a:solidFill>
+                <a:effectLst/>
+                <a:latin typeface="Consolas" panose="020B0609020204030204" pitchFamily="49" charset="0"/>
+              </a:rPr>
+              <a:t>"</a:t>
+            </a:r>
+            <a:r>
+              <a:rPr lang="en-US" sz="2000" b="0" i="0" u="none" strike="noStrike" dirty="0">
+                <a:solidFill>
+                  <a:srgbClr val="FF0000"/>
+                </a:solidFill>
+                <a:effectLst/>
+                <a:latin typeface="Consolas" panose="020B0609020204030204" pitchFamily="49" charset="0"/>
+              </a:rPr>
+              <a:t>/</a:t>
+            </a:r>
+            <a:r>
+              <a:rPr lang="en-US" sz="2000" b="0" i="0" u="none" strike="noStrike" dirty="0">
+                <a:solidFill>
+                  <a:srgbClr val="0000CD"/>
+                </a:solidFill>
+                <a:effectLst/>
+                <a:latin typeface="Consolas" panose="020B0609020204030204" pitchFamily="49" charset="0"/>
+              </a:rPr>
+              <a:t>&gt;</a:t>
+            </a:r>
+            <a:br>
+              <a:rPr lang="en-US" sz="2000" dirty="0"/>
+            </a:br>
+            <a:r>
+              <a:rPr lang="en-US" sz="2000" b="0" i="0" u="none" strike="noStrike" dirty="0">
+                <a:solidFill>
+                  <a:srgbClr val="000000"/>
+                </a:solidFill>
+                <a:effectLst/>
+                <a:latin typeface="Consolas" panose="020B0609020204030204" pitchFamily="49" charset="0"/>
+              </a:rPr>
+              <a:t>    </a:t>
+            </a:r>
+            <a:r>
+              <a:rPr lang="en-US" sz="2000" b="0" i="0" u="none" strike="noStrike" dirty="0">
+                <a:solidFill>
+                  <a:srgbClr val="0000CD"/>
+                </a:solidFill>
+                <a:effectLst/>
+                <a:latin typeface="Consolas" panose="020B0609020204030204" pitchFamily="49" charset="0"/>
+              </a:rPr>
+              <a:t>&lt;</a:t>
+            </a:r>
+            <a:r>
+              <a:rPr lang="en-US" sz="2000" b="0" i="0" u="none" strike="noStrike" dirty="0" err="1">
+                <a:solidFill>
+                  <a:srgbClr val="A52A2A"/>
+                </a:solidFill>
+                <a:effectLst/>
+                <a:latin typeface="Consolas" panose="020B0609020204030204" pitchFamily="49" charset="0"/>
+              </a:rPr>
+              <a:t>xs:element</a:t>
+            </a:r>
+            <a:r>
+              <a:rPr lang="en-US" sz="2000" b="0" i="0" u="none" strike="noStrike" dirty="0">
+                <a:solidFill>
+                  <a:srgbClr val="FF0000"/>
+                </a:solidFill>
+                <a:effectLst/>
+                <a:latin typeface="Consolas" panose="020B0609020204030204" pitchFamily="49" charset="0"/>
+              </a:rPr>
+              <a:t> name</a:t>
+            </a:r>
+            <a:r>
+              <a:rPr lang="en-US" sz="2000" b="0" i="0" u="none" strike="noStrike" dirty="0">
+                <a:solidFill>
+                  <a:srgbClr val="0000CD"/>
+                </a:solidFill>
+                <a:effectLst/>
+                <a:latin typeface="Consolas" panose="020B0609020204030204" pitchFamily="49" charset="0"/>
+              </a:rPr>
+              <a:t>="body"</a:t>
+            </a:r>
+            <a:r>
+              <a:rPr lang="en-US" sz="2000" b="0" i="0" u="none" strike="noStrike" dirty="0">
+                <a:solidFill>
+                  <a:srgbClr val="FF0000"/>
+                </a:solidFill>
+                <a:effectLst/>
+                <a:latin typeface="Consolas" panose="020B0609020204030204" pitchFamily="49" charset="0"/>
+              </a:rPr>
+              <a:t> type</a:t>
+            </a:r>
+            <a:r>
+              <a:rPr lang="en-US" sz="2000" b="0" i="0" u="none" strike="noStrike" dirty="0">
+                <a:solidFill>
+                  <a:srgbClr val="0000CD"/>
+                </a:solidFill>
+                <a:effectLst/>
+                <a:latin typeface="Consolas" panose="020B0609020204030204" pitchFamily="49" charset="0"/>
+              </a:rPr>
+              <a:t>="</a:t>
+            </a:r>
+            <a:r>
+              <a:rPr lang="en-US" sz="2000" b="0" i="0" u="none" strike="noStrike" dirty="0" err="1">
+                <a:solidFill>
+                  <a:srgbClr val="0000CD"/>
+                </a:solidFill>
+                <a:effectLst/>
+                <a:latin typeface="Consolas" panose="020B0609020204030204" pitchFamily="49" charset="0"/>
+              </a:rPr>
+              <a:t>xs:string</a:t>
+            </a:r>
+            <a:r>
+              <a:rPr lang="en-US" sz="2000" b="0" i="0" u="none" strike="noStrike" dirty="0">
+                <a:solidFill>
+                  <a:srgbClr val="0000CD"/>
+                </a:solidFill>
+                <a:effectLst/>
+                <a:latin typeface="Consolas" panose="020B0609020204030204" pitchFamily="49" charset="0"/>
+              </a:rPr>
+              <a:t>"</a:t>
+            </a:r>
+            <a:r>
+              <a:rPr lang="en-US" sz="2000" b="0" i="0" u="none" strike="noStrike" dirty="0">
+                <a:solidFill>
+                  <a:srgbClr val="FF0000"/>
+                </a:solidFill>
+                <a:effectLst/>
+                <a:latin typeface="Consolas" panose="020B0609020204030204" pitchFamily="49" charset="0"/>
+              </a:rPr>
+              <a:t>/</a:t>
+            </a:r>
+            <a:r>
+              <a:rPr lang="en-US" sz="2000" b="0" i="0" u="none" strike="noStrike" dirty="0">
+                <a:solidFill>
+                  <a:srgbClr val="0000CD"/>
+                </a:solidFill>
+                <a:effectLst/>
+                <a:latin typeface="Consolas" panose="020B0609020204030204" pitchFamily="49" charset="0"/>
+              </a:rPr>
+              <a:t>&gt;</a:t>
+            </a:r>
+            <a:br>
+              <a:rPr lang="en-US" sz="2000" dirty="0"/>
+            </a:br>
+            <a:r>
+              <a:rPr lang="en-US" sz="2000" b="0" i="0" u="none" strike="noStrike" dirty="0">
+                <a:solidFill>
+                  <a:srgbClr val="000000"/>
+                </a:solidFill>
+                <a:effectLst/>
+                <a:latin typeface="Consolas" panose="020B0609020204030204" pitchFamily="49" charset="0"/>
+              </a:rPr>
+              <a:t>  </a:t>
+            </a:r>
+            <a:r>
+              <a:rPr lang="en-US" sz="2000" b="0" i="0" u="none" strike="noStrike" dirty="0">
+                <a:solidFill>
+                  <a:srgbClr val="0000CD"/>
+                </a:solidFill>
+                <a:effectLst/>
+                <a:latin typeface="Consolas" panose="020B0609020204030204" pitchFamily="49" charset="0"/>
+              </a:rPr>
+              <a:t>&lt;</a:t>
+            </a:r>
+            <a:r>
+              <a:rPr lang="en-US" sz="2000" b="0" i="0" u="none" strike="noStrike" dirty="0">
+                <a:solidFill>
+                  <a:srgbClr val="A52A2A"/>
+                </a:solidFill>
+                <a:effectLst/>
+                <a:latin typeface="Consolas" panose="020B0609020204030204" pitchFamily="49" charset="0"/>
+              </a:rPr>
+              <a:t>/</a:t>
+            </a:r>
+            <a:r>
+              <a:rPr lang="en-US" sz="2000" b="0" i="0" u="none" strike="noStrike" dirty="0" err="1">
+                <a:solidFill>
+                  <a:srgbClr val="A52A2A"/>
+                </a:solidFill>
+                <a:effectLst/>
+                <a:latin typeface="Consolas" panose="020B0609020204030204" pitchFamily="49" charset="0"/>
+              </a:rPr>
+              <a:t>xs:sequence</a:t>
+            </a:r>
+            <a:r>
+              <a:rPr lang="en-US" sz="2000" b="0" i="0" u="none" strike="noStrike" dirty="0">
+                <a:solidFill>
+                  <a:srgbClr val="0000CD"/>
+                </a:solidFill>
+                <a:effectLst/>
+                <a:latin typeface="Consolas" panose="020B0609020204030204" pitchFamily="49" charset="0"/>
+              </a:rPr>
+              <a:t>&gt;</a:t>
+            </a:r>
+            <a:br>
+              <a:rPr lang="en-US" sz="2000" dirty="0"/>
+            </a:br>
+            <a:r>
+              <a:rPr lang="en-US" sz="2000" b="0" i="0" u="none" strike="noStrike" dirty="0">
+                <a:solidFill>
+                  <a:srgbClr val="0000CD"/>
+                </a:solidFill>
+                <a:effectLst/>
+                <a:latin typeface="Consolas" panose="020B0609020204030204" pitchFamily="49" charset="0"/>
+              </a:rPr>
+              <a:t>&lt;</a:t>
+            </a:r>
+            <a:r>
+              <a:rPr lang="en-US" sz="2000" b="0" i="0" u="none" strike="noStrike" dirty="0">
+                <a:solidFill>
+                  <a:srgbClr val="A52A2A"/>
+                </a:solidFill>
+                <a:effectLst/>
+                <a:latin typeface="Consolas" panose="020B0609020204030204" pitchFamily="49" charset="0"/>
+              </a:rPr>
+              <a:t>/</a:t>
+            </a:r>
+            <a:r>
+              <a:rPr lang="en-US" sz="2000" b="0" i="0" u="none" strike="noStrike" dirty="0" err="1">
+                <a:solidFill>
+                  <a:srgbClr val="A52A2A"/>
+                </a:solidFill>
+                <a:effectLst/>
+                <a:latin typeface="Consolas" panose="020B0609020204030204" pitchFamily="49" charset="0"/>
+              </a:rPr>
+              <a:t>xs:complexType</a:t>
+            </a:r>
+            <a:r>
+              <a:rPr lang="en-US" sz="2000" b="0" i="0" u="none" strike="noStrike" dirty="0">
+                <a:solidFill>
+                  <a:srgbClr val="0000CD"/>
+                </a:solidFill>
+                <a:effectLst/>
+                <a:latin typeface="Consolas" panose="020B0609020204030204" pitchFamily="49" charset="0"/>
+              </a:rPr>
+              <a:t>&gt;</a:t>
+            </a:r>
+            <a:br>
+              <a:rPr lang="en-US" sz="2000" dirty="0"/>
+            </a:br>
+            <a:br>
+              <a:rPr lang="en-US" sz="2000" dirty="0"/>
+            </a:br>
+            <a:r>
+              <a:rPr lang="en-US" sz="2000" b="0" i="0" u="none" strike="noStrike" dirty="0">
+                <a:solidFill>
+                  <a:srgbClr val="0000CD"/>
+                </a:solidFill>
+                <a:effectLst/>
+                <a:latin typeface="Consolas" panose="020B0609020204030204" pitchFamily="49" charset="0"/>
+              </a:rPr>
+              <a:t>&lt;</a:t>
+            </a:r>
+            <a:r>
+              <a:rPr lang="en-US" sz="2000" b="0" i="0" u="none" strike="noStrike" dirty="0">
+                <a:solidFill>
+                  <a:srgbClr val="A52A2A"/>
+                </a:solidFill>
+                <a:effectLst/>
+                <a:latin typeface="Consolas" panose="020B0609020204030204" pitchFamily="49" charset="0"/>
+              </a:rPr>
+              <a:t>/</a:t>
+            </a:r>
+            <a:r>
+              <a:rPr lang="en-US" sz="2000" b="0" i="0" u="none" strike="noStrike" dirty="0" err="1">
+                <a:solidFill>
+                  <a:srgbClr val="A52A2A"/>
+                </a:solidFill>
+                <a:effectLst/>
+                <a:latin typeface="Consolas" panose="020B0609020204030204" pitchFamily="49" charset="0"/>
+              </a:rPr>
+              <a:t>xs:element</a:t>
+            </a:r>
+            <a:r>
+              <a:rPr lang="en-US" sz="2000" b="0" i="0" u="none" strike="noStrike" dirty="0">
+                <a:solidFill>
+                  <a:srgbClr val="0000CD"/>
+                </a:solidFill>
+                <a:effectLst/>
+                <a:latin typeface="Consolas" panose="020B0609020204030204" pitchFamily="49" charset="0"/>
+              </a:rPr>
+              <a:t>&gt;</a:t>
+            </a:r>
+            <a:endParaRPr lang="tr-TR" sz="2000" dirty="0"/>
+          </a:p>
+        </p:txBody>
+      </p:sp>
+    </p:spTree>
+    <p:extLst>
+      <p:ext uri="{BB962C8B-B14F-4D97-AF65-F5344CB8AC3E}">
+        <p14:creationId xmlns:p14="http://schemas.microsoft.com/office/powerpoint/2010/main" val="3590762820"/>
+      </p:ext>
+    </p:extLst>
+  </p:cSld>
+  <p:clrMapOvr>
+    <a:masterClrMapping/>
+  </p:clrMapOvr>
+</p:sld>
+</file>
+
+<file path=ppt/slides/slide17.xml><?xml version="1.0" encoding="utf-8"?>
+<p:sld xmlns:a="http://schemas.openxmlformats.org/drawingml/2006/main" xmlns:r="http://schemas.openxmlformats.org/officeDocument/2006/relationships" xmlns:p="http://schemas.openxmlformats.org/presentationml/2006/main">
+  <p:cSld>
+    <p:spTree>
+      <p:nvGrpSpPr>
+        <p:cNvPr id="1" name=""/>
+        <p:cNvGrpSpPr/>
+        <p:nvPr/>
+      </p:nvGrpSpPr>
+      <p:grpSpPr>
+        <a:xfrm>
+          <a:off x="0" y="0"/>
+          <a:ext cx="0" cy="0"/>
+          <a:chOff x="0" y="0"/>
+          <a:chExt cx="0" cy="0"/>
+        </a:xfrm>
+      </p:grpSpPr>
+      <p:sp>
+        <p:nvSpPr>
+          <p:cNvPr id="2" name="Title 1">
+            <a:extLst>
+              <a:ext uri="{FF2B5EF4-FFF2-40B4-BE49-F238E27FC236}">
+                <a16:creationId xmlns:a16="http://schemas.microsoft.com/office/drawing/2014/main" id="{2E2D751F-B02E-3E2A-2F45-FDFAFCE8D00D}"/>
+              </a:ext>
+            </a:extLst>
+          </p:cNvPr>
+          <p:cNvSpPr>
+            <a:spLocks noGrp="1"/>
+          </p:cNvSpPr>
+          <p:nvPr>
+            <p:ph type="title"/>
+          </p:nvPr>
+        </p:nvSpPr>
+        <p:spPr/>
+        <p:txBody>
+          <a:bodyPr/>
+          <a:lstStyle/>
+          <a:p>
+            <a:r>
+              <a:rPr lang="tr-TR" dirty="0"/>
+              <a:t>XSD</a:t>
+            </a:r>
+          </a:p>
+        </p:txBody>
+      </p:sp>
+      <p:sp>
+        <p:nvSpPr>
+          <p:cNvPr id="3" name="Content Placeholder 2">
+            <a:extLst>
+              <a:ext uri="{FF2B5EF4-FFF2-40B4-BE49-F238E27FC236}">
+                <a16:creationId xmlns:a16="http://schemas.microsoft.com/office/drawing/2014/main" id="{DFD8D7A2-6829-0FB7-00F3-63141498B311}"/>
+              </a:ext>
+            </a:extLst>
+          </p:cNvPr>
+          <p:cNvSpPr>
+            <a:spLocks noGrp="1"/>
+          </p:cNvSpPr>
+          <p:nvPr>
+            <p:ph idx="1"/>
+          </p:nvPr>
+        </p:nvSpPr>
+        <p:spPr/>
+        <p:txBody>
+          <a:bodyPr>
+            <a:normAutofit/>
+          </a:bodyPr>
+          <a:lstStyle/>
+          <a:p>
+            <a:r>
+              <a:rPr lang="tr-TR" sz="2000" dirty="0"/>
+              <a:t>XML Şemaları </a:t>
+            </a:r>
+            <a:r>
+              <a:rPr lang="tr-TR" sz="2000" dirty="0" err="1"/>
+              <a:t>DTD'den</a:t>
+            </a:r>
+            <a:r>
+              <a:rPr lang="tr-TR" sz="2000" dirty="0"/>
+              <a:t> Daha Güçlüdür.</a:t>
+            </a:r>
+          </a:p>
+          <a:p>
+            <a:r>
+              <a:rPr lang="tr-TR" sz="2000" dirty="0"/>
+              <a:t>XML Şemaları </a:t>
+            </a:r>
+            <a:r>
+              <a:rPr lang="tr-TR" sz="2000" dirty="0" err="1"/>
+              <a:t>XML'de</a:t>
+            </a:r>
+            <a:r>
+              <a:rPr lang="tr-TR" sz="2000" dirty="0"/>
+              <a:t> yazılır.</a:t>
+            </a:r>
+          </a:p>
+          <a:p>
+            <a:r>
+              <a:rPr lang="tr-TR" sz="2000" dirty="0"/>
+              <a:t>XML Şemaları eklemeler için genişletilebilir (</a:t>
+            </a:r>
+            <a:r>
+              <a:rPr lang="tr-TR" sz="2000" dirty="0" err="1"/>
+              <a:t>extensible</a:t>
+            </a:r>
+            <a:r>
+              <a:rPr lang="tr-TR" sz="2000" dirty="0"/>
+              <a:t>).</a:t>
+            </a:r>
+          </a:p>
+          <a:p>
+            <a:r>
+              <a:rPr lang="tr-TR" sz="2000" dirty="0"/>
+              <a:t>XML Şemalarının en güçlü yönlerinden biri, veri türleri için destektir.</a:t>
+            </a:r>
+          </a:p>
+          <a:p>
+            <a:r>
+              <a:rPr lang="tr-TR" sz="2000" dirty="0"/>
+              <a:t>Belge içeriğini açıklamak daha kolaydır.</a:t>
+            </a:r>
+          </a:p>
+          <a:p>
+            <a:r>
+              <a:rPr lang="tr-TR" sz="2000" dirty="0"/>
+              <a:t>Veriler üzerindeki kısıtlamaları tanımlamak daha kolaydır.</a:t>
+            </a:r>
+          </a:p>
+          <a:p>
+            <a:r>
+              <a:rPr lang="tr-TR" sz="2000" dirty="0"/>
+              <a:t>Verilerin doğruluğunu doğrulamak daha </a:t>
+            </a:r>
+            <a:r>
+              <a:rPr lang="tr-TR" sz="2000"/>
+              <a:t>kolaydır.</a:t>
+            </a:r>
+            <a:endParaRPr lang="tr-TR" sz="2000" dirty="0"/>
+          </a:p>
+          <a:p>
+            <a:endParaRPr lang="tr-TR" sz="2000" dirty="0"/>
+          </a:p>
+          <a:p>
+            <a:pPr marL="0" indent="0">
+              <a:buNone/>
+            </a:pPr>
+            <a:r>
+              <a:rPr lang="tr-TR" sz="2000" dirty="0">
+                <a:hlinkClick r:id="rId2"/>
+              </a:rPr>
+              <a:t>https://www.liquid-technologies.com/online-xml-to-xsd-converter</a:t>
+            </a:r>
+            <a:endParaRPr lang="tr-TR" sz="2000" dirty="0"/>
+          </a:p>
+          <a:p>
+            <a:pPr marL="0" indent="0">
+              <a:buNone/>
+            </a:pPr>
+            <a:r>
+              <a:rPr lang="tr-TR" sz="2000" dirty="0">
+                <a:hlinkClick r:id="rId3"/>
+              </a:rPr>
+              <a:t>https://www.freeformatter.com/xsd-generator.html</a:t>
+            </a:r>
+            <a:endParaRPr lang="tr-TR" sz="2000" dirty="0"/>
+          </a:p>
+          <a:p>
+            <a:pPr marL="0" indent="0">
+              <a:buNone/>
+            </a:pPr>
+            <a:endParaRPr lang="tr-TR" sz="2000" dirty="0"/>
+          </a:p>
+        </p:txBody>
+      </p:sp>
+    </p:spTree>
+    <p:extLst>
+      <p:ext uri="{BB962C8B-B14F-4D97-AF65-F5344CB8AC3E}">
+        <p14:creationId xmlns:p14="http://schemas.microsoft.com/office/powerpoint/2010/main" val="2696164369"/>
       </p:ext>
     </p:extLst>
   </p:cSld>

</xml_diff>

<commit_message>
updates xml lecture materials
</commit_message>
<xml_diff>
--- a/Slides/Ders 1.pptx
+++ b/Slides/Ders 1.pptx
@@ -5,7 +5,7 @@
     <p:sldMasterId id="2147483660" r:id="rId1"/>
   </p:sldMasterIdLst>
   <p:notesMasterIdLst>
-    <p:notesMasterId r:id="rId19"/>
+    <p:notesMasterId r:id="rId21"/>
   </p:notesMasterIdLst>
   <p:sldIdLst>
     <p:sldId id="256" r:id="rId2"/>
@@ -16,15 +16,17 @@
     <p:sldId id="261" r:id="rId7"/>
     <p:sldId id="262" r:id="rId8"/>
     <p:sldId id="264" r:id="rId9"/>
-    <p:sldId id="263" r:id="rId10"/>
-    <p:sldId id="265" r:id="rId11"/>
-    <p:sldId id="266" r:id="rId12"/>
-    <p:sldId id="267" r:id="rId13"/>
-    <p:sldId id="268" r:id="rId14"/>
-    <p:sldId id="269" r:id="rId15"/>
-    <p:sldId id="271" r:id="rId16"/>
-    <p:sldId id="270" r:id="rId17"/>
-    <p:sldId id="272" r:id="rId18"/>
+    <p:sldId id="274" r:id="rId10"/>
+    <p:sldId id="263" r:id="rId11"/>
+    <p:sldId id="273" r:id="rId12"/>
+    <p:sldId id="265" r:id="rId13"/>
+    <p:sldId id="266" r:id="rId14"/>
+    <p:sldId id="267" r:id="rId15"/>
+    <p:sldId id="268" r:id="rId16"/>
+    <p:sldId id="269" r:id="rId17"/>
+    <p:sldId id="271" r:id="rId18"/>
+    <p:sldId id="270" r:id="rId19"/>
+    <p:sldId id="272" r:id="rId20"/>
   </p:sldIdLst>
   <p:sldSz cx="9144000" cy="6858000" type="screen4x3"/>
   <p:notesSz cx="6858000" cy="9144000"/>
@@ -213,7 +215,7 @@
           <a:p>
             <a:fld id="{DD4244C5-5D67-C540-97C4-F007CFC432EF}" type="datetimeFigureOut">
               <a:rPr lang="tr-TR" smtClean="0"/>
-              <a:t>4.03.2023</a:t>
+              <a:t>9.03.2023</a:t>
             </a:fld>
             <a:endParaRPr lang="tr-TR"/>
           </a:p>
@@ -612,7 +614,7 @@
           <a:p>
             <a:fld id="{26396F4E-1D0B-3F44-AA0F-A3430AE5742F}" type="datetimeFigureOut">
               <a:rPr lang="tr-TR" smtClean="0"/>
-              <a:t>4.03.2023</a:t>
+              <a:t>9.03.2023</a:t>
             </a:fld>
             <a:endParaRPr lang="tr-TR"/>
           </a:p>
@@ -782,7 +784,7 @@
           <a:p>
             <a:fld id="{26396F4E-1D0B-3F44-AA0F-A3430AE5742F}" type="datetimeFigureOut">
               <a:rPr lang="tr-TR" smtClean="0"/>
-              <a:t>4.03.2023</a:t>
+              <a:t>9.03.2023</a:t>
             </a:fld>
             <a:endParaRPr lang="tr-TR"/>
           </a:p>
@@ -962,7 +964,7 @@
           <a:p>
             <a:fld id="{26396F4E-1D0B-3F44-AA0F-A3430AE5742F}" type="datetimeFigureOut">
               <a:rPr lang="tr-TR" smtClean="0"/>
-              <a:t>4.03.2023</a:t>
+              <a:t>9.03.2023</a:t>
             </a:fld>
             <a:endParaRPr lang="tr-TR"/>
           </a:p>
@@ -1132,7 +1134,7 @@
           <a:p>
             <a:fld id="{26396F4E-1D0B-3F44-AA0F-A3430AE5742F}" type="datetimeFigureOut">
               <a:rPr lang="tr-TR" smtClean="0"/>
-              <a:t>4.03.2023</a:t>
+              <a:t>9.03.2023</a:t>
             </a:fld>
             <a:endParaRPr lang="tr-TR"/>
           </a:p>
@@ -1376,7 +1378,7 @@
           <a:p>
             <a:fld id="{26396F4E-1D0B-3F44-AA0F-A3430AE5742F}" type="datetimeFigureOut">
               <a:rPr lang="tr-TR" smtClean="0"/>
-              <a:t>4.03.2023</a:t>
+              <a:t>9.03.2023</a:t>
             </a:fld>
             <a:endParaRPr lang="tr-TR"/>
           </a:p>
@@ -1608,7 +1610,7 @@
           <a:p>
             <a:fld id="{26396F4E-1D0B-3F44-AA0F-A3430AE5742F}" type="datetimeFigureOut">
               <a:rPr lang="tr-TR" smtClean="0"/>
-              <a:t>4.03.2023</a:t>
+              <a:t>9.03.2023</a:t>
             </a:fld>
             <a:endParaRPr lang="tr-TR"/>
           </a:p>
@@ -1975,7 +1977,7 @@
           <a:p>
             <a:fld id="{26396F4E-1D0B-3F44-AA0F-A3430AE5742F}" type="datetimeFigureOut">
               <a:rPr lang="tr-TR" smtClean="0"/>
-              <a:t>4.03.2023</a:t>
+              <a:t>9.03.2023</a:t>
             </a:fld>
             <a:endParaRPr lang="tr-TR"/>
           </a:p>
@@ -2093,7 +2095,7 @@
           <a:p>
             <a:fld id="{26396F4E-1D0B-3F44-AA0F-A3430AE5742F}" type="datetimeFigureOut">
               <a:rPr lang="tr-TR" smtClean="0"/>
-              <a:t>4.03.2023</a:t>
+              <a:t>9.03.2023</a:t>
             </a:fld>
             <a:endParaRPr lang="tr-TR"/>
           </a:p>
@@ -2188,7 +2190,7 @@
           <a:p>
             <a:fld id="{26396F4E-1D0B-3F44-AA0F-A3430AE5742F}" type="datetimeFigureOut">
               <a:rPr lang="tr-TR" smtClean="0"/>
-              <a:t>4.03.2023</a:t>
+              <a:t>9.03.2023</a:t>
             </a:fld>
             <a:endParaRPr lang="tr-TR"/>
           </a:p>
@@ -2465,7 +2467,7 @@
           <a:p>
             <a:fld id="{26396F4E-1D0B-3F44-AA0F-A3430AE5742F}" type="datetimeFigureOut">
               <a:rPr lang="tr-TR" smtClean="0"/>
-              <a:t>4.03.2023</a:t>
+              <a:t>9.03.2023</a:t>
             </a:fld>
             <a:endParaRPr lang="tr-TR"/>
           </a:p>
@@ -2722,7 +2724,7 @@
           <a:p>
             <a:fld id="{26396F4E-1D0B-3F44-AA0F-A3430AE5742F}" type="datetimeFigureOut">
               <a:rPr lang="tr-TR" smtClean="0"/>
-              <a:t>4.03.2023</a:t>
+              <a:t>9.03.2023</a:t>
             </a:fld>
             <a:endParaRPr lang="tr-TR"/>
           </a:p>
@@ -2935,7 +2937,7 @@
           <a:p>
             <a:fld id="{26396F4E-1D0B-3F44-AA0F-A3430AE5742F}" type="datetimeFigureOut">
               <a:rPr lang="tr-TR" smtClean="0"/>
-              <a:t>4.03.2023</a:t>
+              <a:t>9.03.2023</a:t>
             </a:fld>
             <a:endParaRPr lang="tr-TR"/>
           </a:p>
@@ -3564,7 +3566,7 @@
           <p:cNvPr id="2" name="Title 1">
             <a:extLst>
               <a:ext uri="{FF2B5EF4-FFF2-40B4-BE49-F238E27FC236}">
-                <a16:creationId xmlns:a16="http://schemas.microsoft.com/office/drawing/2014/main" id="{AF7CC078-3E4E-EC48-2762-E02581A2780C}"/>
+                <a16:creationId xmlns:a16="http://schemas.microsoft.com/office/drawing/2014/main" id="{B64F1977-FBB6-E6DB-C2B4-5F7AEEEC6842}"/>
               </a:ext>
             </a:extLst>
           </p:cNvPr>
@@ -3582,7 +3584,11 @@
           <a:p>
             <a:r>
               <a:rPr lang="tr-TR" dirty="0"/>
-              <a:t>XML DTD</a:t>
+              <a:t>XML Ayrıştırıcı (</a:t>
+            </a:r>
+            <a:r>
+              <a:rPr lang="tr-TR"/>
+              <a:t>Parser)</a:t>
             </a:r>
           </a:p>
         </p:txBody>
@@ -3592,7 +3598,7 @@
           <p:cNvPr id="3" name="Content Placeholder 2">
             <a:extLst>
               <a:ext uri="{FF2B5EF4-FFF2-40B4-BE49-F238E27FC236}">
-                <a16:creationId xmlns:a16="http://schemas.microsoft.com/office/drawing/2014/main" id="{98F24730-707F-376F-ECFB-FC9FDA7113D1}"/>
+                <a16:creationId xmlns:a16="http://schemas.microsoft.com/office/drawing/2014/main" id="{0AB76B48-969D-C750-C5B8-8CEF6B5E9745}"/>
               </a:ext>
             </a:extLst>
           </p:cNvPr>
@@ -3606,85 +3612,73 @@
         <p:spPr/>
         <p:txBody>
           <a:bodyPr>
-            <a:normAutofit fontScale="85000" lnSpcReduction="20000"/>
+            <a:normAutofit fontScale="70000" lnSpcReduction="20000"/>
           </a:bodyPr>
           <a:lstStyle/>
           <a:p>
-            <a:pPr marL="0" indent="0">
-              <a:buNone/>
-            </a:pPr>
-            <a:r>
-              <a:rPr lang="tr-TR" dirty="0"/>
-              <a:t>Bir XML:</a:t>
-            </a:r>
-          </a:p>
-          <a:p>
-            <a:r>
-              <a:rPr lang="tr-TR" dirty="0"/>
-              <a:t>Eleman etiketleri (</a:t>
+            <a:r>
+              <a:rPr lang="tr-TR" dirty="0"/>
+              <a:t>XML DOM (</a:t>
             </a:r>
             <a:r>
               <a:rPr lang="tr-TR" dirty="0" err="1"/>
-              <a:t>tags</a:t>
-            </a:r>
-            <a:r>
-              <a:rPr lang="tr-TR" dirty="0"/>
-              <a:t>) doğru açılıp kapatıldığında,</a:t>
+              <a:t>Document</a:t>
+            </a:r>
+            <a:r>
+              <a:rPr lang="tr-TR" dirty="0"/>
+              <a:t> Object Model - Belge Nesne Modeli), </a:t>
+            </a:r>
+            <a:r>
+              <a:rPr lang="tr-TR" dirty="0" err="1"/>
+              <a:t>XML'e</a:t>
+            </a:r>
+            <a:r>
+              <a:rPr lang="tr-TR" dirty="0"/>
+              <a:t> erişmek ve </a:t>
+            </a:r>
+            <a:r>
+              <a:rPr lang="tr-TR" dirty="0" err="1"/>
+              <a:t>XML'i</a:t>
+            </a:r>
+            <a:r>
+              <a:rPr lang="tr-TR" dirty="0"/>
+              <a:t> düzenlemek için özellikleri ve yöntemleri tanımlar.</a:t>
             </a:r>
           </a:p>
           <a:p>
             <a:endParaRPr lang="tr-TR" dirty="0"/>
           </a:p>
           <a:p>
+            <a:r>
+              <a:rPr lang="tr-TR" dirty="0"/>
+              <a:t>Bir XML dokümanına erişilebilmesi için işlenecek dosyanın önce bir XML DOM nesnesine yüklenmesi gerekir.</a:t>
+            </a:r>
+          </a:p>
+          <a:p>
             <a:endParaRPr lang="tr-TR" dirty="0"/>
           </a:p>
           <a:p>
             <a:r>
               <a:rPr lang="tr-TR" dirty="0"/>
-              <a:t>Her elemanın özellikleri (</a:t>
-            </a:r>
-            <a:r>
-              <a:rPr lang="tr-TR" dirty="0" err="1"/>
-              <a:t>attributes</a:t>
-            </a:r>
-            <a:r>
-              <a:rPr lang="tr-TR" dirty="0"/>
-              <a:t>) tekrar etmediğinde,</a:t>
+              <a:t>XML DOM ile bir XML dokümanı bir ağaç şeklinde ifade edilebilecek hale dönüştürülür.</a:t>
             </a:r>
           </a:p>
           <a:p>
             <a:endParaRPr lang="tr-TR" dirty="0"/>
           </a:p>
           <a:p>
+            <a:r>
+              <a:rPr lang="tr-TR" dirty="0"/>
+              <a:t>XML DOM, XML öğelerinin nasıl alınacağına, değiştirileceğine, ekleneceğine veya silineceğine ilişkin bir standarttır.</a:t>
+            </a:r>
+          </a:p>
+          <a:p>
             <a:endParaRPr lang="tr-TR" dirty="0"/>
           </a:p>
           <a:p>
             <a:r>
               <a:rPr lang="tr-TR" dirty="0"/>
-              <a:t>Dokümanda sadece 1 tane kök eleman olduğunda</a:t>
-            </a:r>
-          </a:p>
-          <a:p>
-            <a:endParaRPr lang="tr-TR" dirty="0"/>
-          </a:p>
-          <a:p>
-            <a:endParaRPr lang="tr-TR" dirty="0"/>
-          </a:p>
-          <a:p>
-            <a:pPr marL="0" indent="0">
-              <a:buNone/>
-            </a:pPr>
-            <a:r>
-              <a:rPr lang="tr-TR" dirty="0"/>
-              <a:t>iyi biçimlendirilmiş (</a:t>
-            </a:r>
-            <a:r>
-              <a:rPr lang="tr-TR" dirty="0" err="1"/>
-              <a:t>well-formed</a:t>
-            </a:r>
-            <a:r>
-              <a:rPr lang="tr-TR" dirty="0"/>
-              <a:t>) olarak adlandırılır.</a:t>
+              <a:t>JavaScript ile örnek uygulama.</a:t>
             </a:r>
           </a:p>
         </p:txBody>
@@ -3692,7 +3686,7 @@
     </p:spTree>
     <p:extLst>
       <p:ext uri="{BB962C8B-B14F-4D97-AF65-F5344CB8AC3E}">
-        <p14:creationId xmlns:p14="http://schemas.microsoft.com/office/powerpoint/2010/main" val="3022938221"/>
+        <p14:creationId xmlns:p14="http://schemas.microsoft.com/office/powerpoint/2010/main" val="2174812847"/>
       </p:ext>
     </p:extLst>
   </p:cSld>
@@ -3724,7 +3718,7 @@
           <p:cNvPr id="2" name="Title 1">
             <a:extLst>
               <a:ext uri="{FF2B5EF4-FFF2-40B4-BE49-F238E27FC236}">
-                <a16:creationId xmlns:a16="http://schemas.microsoft.com/office/drawing/2014/main" id="{AF7CC078-3E4E-EC48-2762-E02581A2780C}"/>
+                <a16:creationId xmlns:a16="http://schemas.microsoft.com/office/drawing/2014/main" id="{B64F1977-FBB6-E6DB-C2B4-5F7AEEEC6842}"/>
               </a:ext>
             </a:extLst>
           </p:cNvPr>
@@ -3742,75 +3736,19 @@
           <a:p>
             <a:r>
               <a:rPr lang="tr-TR" dirty="0"/>
-              <a:t>XML DTD</a:t>
-            </a:r>
-          </a:p>
-        </p:txBody>
-      </p:sp>
-      <p:sp>
-        <p:nvSpPr>
-          <p:cNvPr id="3" name="Content Placeholder 2">
-            <a:extLst>
-              <a:ext uri="{FF2B5EF4-FFF2-40B4-BE49-F238E27FC236}">
-                <a16:creationId xmlns:a16="http://schemas.microsoft.com/office/drawing/2014/main" id="{98F24730-707F-376F-ECFB-FC9FDA7113D1}"/>
-              </a:ext>
-            </a:extLst>
-          </p:cNvPr>
-          <p:cNvSpPr>
-            <a:spLocks noGrp="1"/>
-          </p:cNvSpPr>
-          <p:nvPr>
-            <p:ph idx="1"/>
-          </p:nvPr>
-        </p:nvSpPr>
-        <p:spPr/>
-        <p:txBody>
-          <a:bodyPr>
-            <a:normAutofit/>
-          </a:bodyPr>
-          <a:lstStyle/>
-          <a:p>
-            <a:pPr marL="0" indent="0">
-              <a:buNone/>
-            </a:pPr>
-            <a:r>
-              <a:rPr lang="tr-TR" dirty="0"/>
-              <a:t>Ancak XML iyi biçimlendirilmiş olsa da bir standardı takip etmek zorunda değildir.</a:t>
-            </a:r>
-          </a:p>
-          <a:p>
-            <a:pPr marL="0" indent="0">
-              <a:buNone/>
-            </a:pPr>
-            <a:r>
-              <a:rPr lang="tr-TR" dirty="0"/>
-              <a:t>Ör:</a:t>
-            </a:r>
-          </a:p>
-          <a:p>
-            <a:pPr marL="0" indent="0">
-              <a:buNone/>
-            </a:pPr>
-            <a:endParaRPr lang="tr-TR" dirty="0"/>
-          </a:p>
-          <a:p>
-            <a:pPr marL="0" indent="0">
-              <a:buNone/>
-            </a:pPr>
-            <a:endParaRPr lang="tr-TR" dirty="0"/>
-          </a:p>
-          <a:p>
-            <a:pPr marL="0" indent="0">
-              <a:buNone/>
-            </a:pPr>
-            <a:endParaRPr lang="tr-TR" dirty="0"/>
+              <a:t>XML Ayrıştırıcı (</a:t>
+            </a:r>
+            <a:r>
+              <a:rPr lang="tr-TR"/>
+              <a:t>Parser)</a:t>
+            </a:r>
           </a:p>
         </p:txBody>
       </p:sp>
     </p:spTree>
     <p:extLst>
       <p:ext uri="{BB962C8B-B14F-4D97-AF65-F5344CB8AC3E}">
-        <p14:creationId xmlns:p14="http://schemas.microsoft.com/office/powerpoint/2010/main" val="4031541290"/>
+        <p14:creationId xmlns:p14="http://schemas.microsoft.com/office/powerpoint/2010/main" val="788106688"/>
       </p:ext>
     </p:extLst>
   </p:cSld>
@@ -3884,115 +3822,93 @@
         <p:spPr/>
         <p:txBody>
           <a:bodyPr>
-            <a:normAutofit/>
+            <a:normAutofit fontScale="85000" lnSpcReduction="20000"/>
           </a:bodyPr>
           <a:lstStyle/>
           <a:p>
-            <a:r>
-              <a:rPr lang="tr-TR" dirty="0"/>
-              <a:t>XML DTD (</a:t>
+            <a:pPr marL="0" indent="0">
+              <a:buNone/>
+            </a:pPr>
+            <a:r>
+              <a:rPr lang="tr-TR" dirty="0"/>
+              <a:t>Bir XML:</a:t>
+            </a:r>
+          </a:p>
+          <a:p>
+            <a:r>
+              <a:rPr lang="tr-TR" dirty="0"/>
+              <a:t>Eleman etiketleri (</a:t>
             </a:r>
             <a:r>
               <a:rPr lang="tr-TR" dirty="0" err="1"/>
-              <a:t>Document</a:t>
-            </a:r>
-            <a:r>
-              <a:rPr lang="tr-TR" dirty="0"/>
-              <a:t> </a:t>
+              <a:t>tags</a:t>
+            </a:r>
+            <a:r>
+              <a:rPr lang="tr-TR" dirty="0"/>
+              <a:t>) doğru açılıp kapatıldığında,</a:t>
+            </a:r>
+          </a:p>
+          <a:p>
+            <a:endParaRPr lang="tr-TR" dirty="0"/>
+          </a:p>
+          <a:p>
+            <a:endParaRPr lang="tr-TR" dirty="0"/>
+          </a:p>
+          <a:p>
+            <a:r>
+              <a:rPr lang="tr-TR" dirty="0"/>
+              <a:t>Her elemanın özellikleri (</a:t>
             </a:r>
             <a:r>
               <a:rPr lang="tr-TR" dirty="0" err="1"/>
-              <a:t>Type</a:t>
-            </a:r>
-            <a:r>
-              <a:rPr lang="tr-TR" dirty="0"/>
-              <a:t> Definition - Belge Türü Tanımı) ile bir </a:t>
+              <a:t>attributes</a:t>
+            </a:r>
+            <a:r>
+              <a:rPr lang="tr-TR" dirty="0"/>
+              <a:t>) tekrar etmediğinde,</a:t>
+            </a:r>
+          </a:p>
+          <a:p>
+            <a:endParaRPr lang="tr-TR" dirty="0"/>
+          </a:p>
+          <a:p>
+            <a:endParaRPr lang="tr-TR" dirty="0"/>
+          </a:p>
+          <a:p>
+            <a:r>
+              <a:rPr lang="tr-TR" dirty="0"/>
+              <a:t>Dokümanda sadece 1 tane kök eleman olduğunda</a:t>
+            </a:r>
+          </a:p>
+          <a:p>
+            <a:endParaRPr lang="tr-TR" dirty="0"/>
+          </a:p>
+          <a:p>
+            <a:endParaRPr lang="tr-TR" dirty="0"/>
+          </a:p>
+          <a:p>
+            <a:pPr marL="0" indent="0">
+              <a:buNone/>
+            </a:pPr>
+            <a:r>
+              <a:rPr lang="tr-TR" dirty="0"/>
+              <a:t>iyi biçimlendirilmiş (</a:t>
             </a:r>
             <a:r>
               <a:rPr lang="tr-TR" dirty="0" err="1"/>
-              <a:t>XML'in</a:t>
-            </a:r>
-            <a:r>
-              <a:rPr lang="tr-TR" dirty="0"/>
-              <a:t> yapısı, barındıracağı elemanlar ve elemanlarının özellikleri belirlenebilir.</a:t>
-            </a:r>
-          </a:p>
-          <a:p>
-            <a:r>
-              <a:rPr lang="tr-TR" dirty="0"/>
-              <a:t>DTD ile kısıtlanmış </a:t>
-            </a:r>
-            <a:r>
-              <a:rPr lang="tr-TR" dirty="0" err="1"/>
-              <a:t>XML'ler</a:t>
-            </a:r>
-            <a:r>
-              <a:rPr lang="tr-TR" dirty="0"/>
-              <a:t> taraflar arasında güvenli şekilde iletişimde kullanılabilir.</a:t>
-            </a:r>
-          </a:p>
-          <a:p>
-            <a:r>
-              <a:rPr lang="tr-TR" dirty="0"/>
-              <a:t>Bir </a:t>
-            </a:r>
-            <a:r>
-              <a:rPr lang="tr-TR" dirty="0" err="1"/>
-              <a:t>XML'in</a:t>
-            </a:r>
-            <a:r>
-              <a:rPr lang="tr-TR" dirty="0"/>
-              <a:t> </a:t>
-            </a:r>
-            <a:r>
-              <a:rPr lang="tr-TR" dirty="0" err="1"/>
-              <a:t>DTD'ye</a:t>
-            </a:r>
-            <a:r>
-              <a:rPr lang="tr-TR" dirty="0"/>
-              <a:t> uyup uymadığı kontrol edilebilir. Eğer XML, </a:t>
-            </a:r>
-            <a:r>
-              <a:rPr lang="tr-TR" dirty="0" err="1"/>
-              <a:t>DTD'ye</a:t>
-            </a:r>
-            <a:r>
-              <a:rPr lang="tr-TR" dirty="0"/>
-              <a:t> uygunsa, XML geçerli (</a:t>
-            </a:r>
-            <a:r>
-              <a:rPr lang="tr-TR" dirty="0" err="1"/>
-              <a:t>valid</a:t>
+              <a:t>well-formed</a:t>
             </a:r>
             <a:r>
               <a:rPr lang="tr-TR" dirty="0"/>
               <a:t>) olarak adlandırılır.</a:t>
             </a:r>
-          </a:p>
-          <a:p>
-            <a:pPr marL="0" indent="0">
-              <a:buNone/>
-            </a:pPr>
-            <a:endParaRPr lang="tr-TR" dirty="0"/>
-          </a:p>
-          <a:p>
-            <a:pPr marL="0" indent="0">
-              <a:buNone/>
-            </a:pPr>
-            <a:endParaRPr lang="tr-TR" dirty="0"/>
-          </a:p>
-          <a:p>
-            <a:pPr marL="0" indent="0">
-              <a:buNone/>
-            </a:pPr>
-            <a:endParaRPr lang="tr-TR" dirty="0"/>
           </a:p>
         </p:txBody>
       </p:sp>
     </p:spTree>
     <p:extLst>
       <p:ext uri="{BB962C8B-B14F-4D97-AF65-F5344CB8AC3E}">
-        <p14:creationId xmlns:p14="http://schemas.microsoft.com/office/powerpoint/2010/main" val="1520125017"/>
+        <p14:creationId xmlns:p14="http://schemas.microsoft.com/office/powerpoint/2010/main" val="3022938221"/>
       </p:ext>
     </p:extLst>
   </p:cSld>
@@ -4066,7 +3982,7 @@
         <p:spPr/>
         <p:txBody>
           <a:bodyPr>
-            <a:normAutofit fontScale="55000" lnSpcReduction="20000"/>
+            <a:normAutofit/>
           </a:bodyPr>
           <a:lstStyle/>
           <a:p>
@@ -4074,14 +3990,8 @@
               <a:buNone/>
             </a:pPr>
             <a:r>
-              <a:rPr lang="en-US" b="0" i="0" u="none" strike="noStrike" dirty="0">
-                <a:solidFill>
-                  <a:srgbClr val="0000CD"/>
-                </a:solidFill>
-                <a:effectLst/>
-                <a:latin typeface="Consolas" panose="020B0609020204030204" pitchFamily="49" charset="0"/>
-              </a:rPr>
-              <a:t>&lt;?xml version="1.0"?&gt;</a:t>
+              <a:rPr lang="tr-TR" dirty="0"/>
+              <a:t>Ancak XML iyi biçimlendirilmiş olsa da bir standardı takip etmek zorunda değildir.</a:t>
             </a:r>
           </a:p>
           <a:p>
@@ -4089,236 +3999,9 @@
               <a:buNone/>
             </a:pPr>
             <a:r>
-              <a:rPr lang="en-US" b="0" i="0" u="none" strike="noStrike" dirty="0">
-                <a:solidFill>
-                  <a:srgbClr val="0000CD"/>
-                </a:solidFill>
-                <a:effectLst/>
-                <a:latin typeface="Consolas" panose="020B0609020204030204" pitchFamily="49" charset="0"/>
-              </a:rPr>
-              <a:t>&lt;!DOCTYPE note [</a:t>
-            </a:r>
-          </a:p>
-          <a:p>
-            <a:pPr marL="0" indent="0">
-              <a:buNone/>
-            </a:pPr>
-            <a:r>
-              <a:rPr lang="en-US" b="0" i="0" u="none" strike="noStrike" dirty="0">
-                <a:solidFill>
-                  <a:srgbClr val="0000CD"/>
-                </a:solidFill>
-                <a:effectLst/>
-                <a:latin typeface="Consolas" panose="020B0609020204030204" pitchFamily="49" charset="0"/>
-              </a:rPr>
-              <a:t>  &lt;!ELEMENT note    (</a:t>
-            </a:r>
-            <a:r>
-              <a:rPr lang="en-US" b="0" i="0" u="none" strike="noStrike" dirty="0" err="1">
-                <a:solidFill>
-                  <a:srgbClr val="0000CD"/>
-                </a:solidFill>
-                <a:effectLst/>
-                <a:latin typeface="Consolas" panose="020B0609020204030204" pitchFamily="49" charset="0"/>
-              </a:rPr>
-              <a:t>to,from,heading,body</a:t>
-            </a:r>
-            <a:r>
-              <a:rPr lang="en-US" b="0" i="0" u="none" strike="noStrike" dirty="0">
-                <a:solidFill>
-                  <a:srgbClr val="0000CD"/>
-                </a:solidFill>
-                <a:effectLst/>
-                <a:latin typeface="Consolas" panose="020B0609020204030204" pitchFamily="49" charset="0"/>
-              </a:rPr>
-              <a:t>)&gt;</a:t>
-            </a:r>
-          </a:p>
-          <a:p>
-            <a:pPr marL="0" indent="0">
-              <a:buNone/>
-            </a:pPr>
-            <a:r>
-              <a:rPr lang="en-US" b="0" i="0" u="none" strike="noStrike" dirty="0">
-                <a:solidFill>
-                  <a:srgbClr val="0000CD"/>
-                </a:solidFill>
-                <a:effectLst/>
-                <a:latin typeface="Consolas" panose="020B0609020204030204" pitchFamily="49" charset="0"/>
-              </a:rPr>
-              <a:t>  &lt;!ELEMENT to      (#PCDATA)&gt;</a:t>
-            </a:r>
-          </a:p>
-          <a:p>
-            <a:pPr marL="0" indent="0">
-              <a:buNone/>
-            </a:pPr>
-            <a:r>
-              <a:rPr lang="en-US" b="0" i="0" u="none" strike="noStrike" dirty="0">
-                <a:solidFill>
-                  <a:srgbClr val="0000CD"/>
-                </a:solidFill>
-                <a:effectLst/>
-                <a:latin typeface="Consolas" panose="020B0609020204030204" pitchFamily="49" charset="0"/>
-              </a:rPr>
-              <a:t>  &lt;!ELEMENT from    (#PCDATA)&gt;</a:t>
-            </a:r>
-          </a:p>
-          <a:p>
-            <a:pPr marL="0" indent="0">
-              <a:buNone/>
-            </a:pPr>
-            <a:r>
-              <a:rPr lang="en-US" b="0" i="0" u="none" strike="noStrike" dirty="0">
-                <a:solidFill>
-                  <a:srgbClr val="0000CD"/>
-                </a:solidFill>
-                <a:effectLst/>
-                <a:latin typeface="Consolas" panose="020B0609020204030204" pitchFamily="49" charset="0"/>
-              </a:rPr>
-              <a:t>  &lt;!ELEMENT heading (#PCDATA)&gt;</a:t>
-            </a:r>
-          </a:p>
-          <a:p>
-            <a:pPr marL="0" indent="0">
-              <a:buNone/>
-            </a:pPr>
-            <a:r>
-              <a:rPr lang="en-US" b="0" i="0" u="none" strike="noStrike" dirty="0">
-                <a:solidFill>
-                  <a:srgbClr val="0000CD"/>
-                </a:solidFill>
-                <a:effectLst/>
-                <a:latin typeface="Consolas" panose="020B0609020204030204" pitchFamily="49" charset="0"/>
-              </a:rPr>
-              <a:t>  &lt;!ELEMENT body    (#PCDATA)&gt;</a:t>
-            </a:r>
-          </a:p>
-          <a:p>
-            <a:pPr marL="0" indent="0">
-              <a:buNone/>
-            </a:pPr>
-            <a:r>
-              <a:rPr lang="en-US" b="0" i="0" u="none" strike="noStrike" dirty="0">
-                <a:solidFill>
-                  <a:srgbClr val="0000CD"/>
-                </a:solidFill>
-                <a:effectLst/>
-                <a:latin typeface="Consolas" panose="020B0609020204030204" pitchFamily="49" charset="0"/>
-              </a:rPr>
-              <a:t>]&gt;</a:t>
-            </a:r>
-          </a:p>
-          <a:p>
-            <a:pPr marL="0" indent="0">
-              <a:buNone/>
-            </a:pPr>
-            <a:r>
-              <a:rPr lang="en-US" b="0" i="0" u="none" strike="noStrike" dirty="0">
-                <a:solidFill>
-                  <a:srgbClr val="0000CD"/>
-                </a:solidFill>
-                <a:effectLst/>
-                <a:latin typeface="Consolas" panose="020B0609020204030204" pitchFamily="49" charset="0"/>
-              </a:rPr>
-              <a:t>&lt;note&gt;</a:t>
-            </a:r>
-          </a:p>
-          <a:p>
-            <a:pPr marL="0" indent="0">
-              <a:buNone/>
-            </a:pPr>
-            <a:r>
-              <a:rPr lang="en-US" b="0" i="0" u="none" strike="noStrike" dirty="0">
-                <a:solidFill>
-                  <a:srgbClr val="0000CD"/>
-                </a:solidFill>
-                <a:effectLst/>
-                <a:latin typeface="Consolas" panose="020B0609020204030204" pitchFamily="49" charset="0"/>
-              </a:rPr>
-              <a:t>  &lt;to&gt;</a:t>
-            </a:r>
-            <a:r>
-              <a:rPr lang="en-US" b="0" i="0" u="none" strike="noStrike" dirty="0" err="1">
-                <a:solidFill>
-                  <a:srgbClr val="0000CD"/>
-                </a:solidFill>
-                <a:effectLst/>
-                <a:latin typeface="Consolas" panose="020B0609020204030204" pitchFamily="49" charset="0"/>
-              </a:rPr>
-              <a:t>Tove</a:t>
-            </a:r>
-            <a:r>
-              <a:rPr lang="en-US" b="0" i="0" u="none" strike="noStrike" dirty="0">
-                <a:solidFill>
-                  <a:srgbClr val="0000CD"/>
-                </a:solidFill>
-                <a:effectLst/>
-                <a:latin typeface="Consolas" panose="020B0609020204030204" pitchFamily="49" charset="0"/>
-              </a:rPr>
-              <a:t>&lt;/to&gt;</a:t>
-            </a:r>
-          </a:p>
-          <a:p>
-            <a:pPr marL="0" indent="0">
-              <a:buNone/>
-            </a:pPr>
-            <a:r>
-              <a:rPr lang="en-US" b="0" i="0" u="none" strike="noStrike" dirty="0">
-                <a:solidFill>
-                  <a:srgbClr val="0000CD"/>
-                </a:solidFill>
-                <a:effectLst/>
-                <a:latin typeface="Consolas" panose="020B0609020204030204" pitchFamily="49" charset="0"/>
-              </a:rPr>
-              <a:t>  &lt;from&gt;Jani&lt;/from&gt;</a:t>
-            </a:r>
-          </a:p>
-          <a:p>
-            <a:pPr marL="0" indent="0">
-              <a:buNone/>
-            </a:pPr>
-            <a:r>
-              <a:rPr lang="en-US" b="0" i="0" u="none" strike="noStrike" dirty="0">
-                <a:solidFill>
-                  <a:srgbClr val="0000CD"/>
-                </a:solidFill>
-                <a:effectLst/>
-                <a:latin typeface="Consolas" panose="020B0609020204030204" pitchFamily="49" charset="0"/>
-              </a:rPr>
-              <a:t>  &lt;heading&gt;Reminder&lt;/heading&gt;</a:t>
-            </a:r>
-          </a:p>
-          <a:p>
-            <a:pPr marL="0" indent="0">
-              <a:buNone/>
-            </a:pPr>
-            <a:r>
-              <a:rPr lang="en-US" b="0" i="0" u="none" strike="noStrike" dirty="0">
-                <a:solidFill>
-                  <a:srgbClr val="0000CD"/>
-                </a:solidFill>
-                <a:effectLst/>
-                <a:latin typeface="Consolas" panose="020B0609020204030204" pitchFamily="49" charset="0"/>
-              </a:rPr>
-              <a:t>  &lt;body&gt;Don't forget me this weekend!&lt;/body&gt;</a:t>
-            </a:r>
-          </a:p>
-          <a:p>
-            <a:pPr marL="0" indent="0">
-              <a:buNone/>
-            </a:pPr>
-            <a:r>
-              <a:rPr lang="en-US" b="0" i="0" u="none" strike="noStrike" dirty="0">
-                <a:solidFill>
-                  <a:srgbClr val="0000CD"/>
-                </a:solidFill>
-                <a:effectLst/>
-                <a:latin typeface="Consolas" panose="020B0609020204030204" pitchFamily="49" charset="0"/>
-              </a:rPr>
-              <a:t>&lt;/note&gt; </a:t>
-            </a:r>
-            <a:endParaRPr lang="tr-TR" dirty="0"/>
+              <a:rPr lang="tr-TR" dirty="0"/>
+              <a:t>Ör:</a:t>
+            </a:r>
           </a:p>
           <a:p>
             <a:pPr marL="0" indent="0">
@@ -4326,56 +4009,16 @@
             </a:pPr>
             <a:endParaRPr lang="tr-TR" dirty="0"/>
           </a:p>
-        </p:txBody>
-      </p:sp>
-      <p:sp>
-        <p:nvSpPr>
-          <p:cNvPr id="4" name="TextBox 3">
-            <a:extLst>
-              <a:ext uri="{FF2B5EF4-FFF2-40B4-BE49-F238E27FC236}">
-                <a16:creationId xmlns:a16="http://schemas.microsoft.com/office/drawing/2014/main" id="{8D65BDE3-391D-84E5-CC93-9308F3FBB03A}"/>
-              </a:ext>
-            </a:extLst>
-          </p:cNvPr>
-          <p:cNvSpPr txBox="1"/>
-          <p:nvPr/>
-        </p:nvSpPr>
-        <p:spPr>
-          <a:xfrm>
-            <a:off x="628650" y="6311899"/>
-            <a:ext cx="5106847" cy="369332"/>
-          </a:xfrm>
-          <a:prstGeom prst="rect">
-            <a:avLst/>
-          </a:prstGeom>
-          <a:noFill/>
-        </p:spPr>
-        <p:txBody>
-          <a:bodyPr wrap="none" rtlCol="0">
-            <a:spAutoFit/>
-          </a:bodyPr>
-          <a:lstStyle/>
-          <a:p>
-            <a:r>
-              <a:rPr lang="tr-TR" dirty="0" err="1"/>
-              <a:t>https</a:t>
-            </a:r>
-            <a:r>
-              <a:rPr lang="tr-TR" dirty="0"/>
-              <a:t>://www.w3schools.com/</a:t>
-            </a:r>
-            <a:r>
-              <a:rPr lang="tr-TR" dirty="0" err="1"/>
-              <a:t>xml</a:t>
-            </a:r>
-            <a:r>
-              <a:rPr lang="tr-TR" dirty="0"/>
-              <a:t>/</a:t>
-            </a:r>
-            <a:r>
-              <a:rPr lang="tr-TR" dirty="0" err="1"/>
-              <a:t>xml_dtd_intro.asp</a:t>
-            </a:r>
+          <a:p>
+            <a:pPr marL="0" indent="0">
+              <a:buNone/>
+            </a:pPr>
+            <a:endParaRPr lang="tr-TR" dirty="0"/>
+          </a:p>
+          <a:p>
+            <a:pPr marL="0" indent="0">
+              <a:buNone/>
+            </a:pPr>
             <a:endParaRPr lang="tr-TR" dirty="0"/>
           </a:p>
         </p:txBody>
@@ -4383,7 +4026,7 @@
     </p:spTree>
     <p:extLst>
       <p:ext uri="{BB962C8B-B14F-4D97-AF65-F5344CB8AC3E}">
-        <p14:creationId xmlns:p14="http://schemas.microsoft.com/office/powerpoint/2010/main" val="715129201"/>
+        <p14:creationId xmlns:p14="http://schemas.microsoft.com/office/powerpoint/2010/main" val="4031541290"/>
       </p:ext>
     </p:extLst>
   </p:cSld>
@@ -4415,7 +4058,7 @@
           <p:cNvPr id="2" name="Title 1">
             <a:extLst>
               <a:ext uri="{FF2B5EF4-FFF2-40B4-BE49-F238E27FC236}">
-                <a16:creationId xmlns:a16="http://schemas.microsoft.com/office/drawing/2014/main" id="{8FFD4E0D-BF44-B94D-3CCA-99CA96624D6C}"/>
+                <a16:creationId xmlns:a16="http://schemas.microsoft.com/office/drawing/2014/main" id="{AF7CC078-3E4E-EC48-2762-E02581A2780C}"/>
               </a:ext>
             </a:extLst>
           </p:cNvPr>
@@ -4443,7 +4086,7 @@
           <p:cNvPr id="3" name="Content Placeholder 2">
             <a:extLst>
               <a:ext uri="{FF2B5EF4-FFF2-40B4-BE49-F238E27FC236}">
-                <a16:creationId xmlns:a16="http://schemas.microsoft.com/office/drawing/2014/main" id="{E1CC99E5-AE24-A4C9-3EE4-FF13D2A8F11F}"/>
+                <a16:creationId xmlns:a16="http://schemas.microsoft.com/office/drawing/2014/main" id="{98F24730-707F-376F-ECFB-FC9FDA7113D1}"/>
               </a:ext>
             </a:extLst>
           </p:cNvPr>
@@ -4456,20 +4099,116 @@
         </p:nvSpPr>
         <p:spPr/>
         <p:txBody>
-          <a:bodyPr/>
-          <a:lstStyle/>
-          <a:p>
-            <a:r>
-              <a:rPr lang="tr-TR" dirty="0"/>
-              <a:t>Uygulama</a:t>
-            </a:r>
+          <a:bodyPr>
+            <a:normAutofit/>
+          </a:bodyPr>
+          <a:lstStyle/>
+          <a:p>
+            <a:r>
+              <a:rPr lang="tr-TR" dirty="0"/>
+              <a:t>XML DTD (</a:t>
+            </a:r>
+            <a:r>
+              <a:rPr lang="tr-TR" dirty="0" err="1"/>
+              <a:t>Document</a:t>
+            </a:r>
+            <a:r>
+              <a:rPr lang="tr-TR" dirty="0"/>
+              <a:t> </a:t>
+            </a:r>
+            <a:r>
+              <a:rPr lang="tr-TR" dirty="0" err="1"/>
+              <a:t>Type</a:t>
+            </a:r>
+            <a:r>
+              <a:rPr lang="tr-TR" dirty="0"/>
+              <a:t> Definition - Belge Türü Tanımı) ile bir </a:t>
+            </a:r>
+            <a:r>
+              <a:rPr lang="tr-TR" dirty="0" err="1"/>
+              <a:t>XML'in</a:t>
+            </a:r>
+            <a:r>
+              <a:rPr lang="tr-TR" dirty="0"/>
+              <a:t> yapısı, barındıracağı elemanlar ve elemanlarının özellikleri belirlenebilir.</a:t>
+            </a:r>
+          </a:p>
+          <a:p>
+            <a:r>
+              <a:rPr lang="tr-TR" dirty="0"/>
+              <a:t>DTD ile kısıtlanmış </a:t>
+            </a:r>
+            <a:r>
+              <a:rPr lang="tr-TR" dirty="0" err="1"/>
+              <a:t>XML'ler</a:t>
+            </a:r>
+            <a:r>
+              <a:rPr lang="tr-TR" dirty="0"/>
+              <a:t> taraflar arasında güvenli şekilde iletişimde kullanılabilir.</a:t>
+            </a:r>
+          </a:p>
+          <a:p>
+            <a:r>
+              <a:rPr lang="tr-TR" dirty="0"/>
+              <a:t>Bir </a:t>
+            </a:r>
+            <a:r>
+              <a:rPr lang="tr-TR" dirty="0" err="1"/>
+              <a:t>XML'in</a:t>
+            </a:r>
+            <a:r>
+              <a:rPr lang="tr-TR" dirty="0"/>
+              <a:t> </a:t>
+            </a:r>
+            <a:r>
+              <a:rPr lang="tr-TR" dirty="0" err="1"/>
+              <a:t>DTD'ye</a:t>
+            </a:r>
+            <a:r>
+              <a:rPr lang="tr-TR" dirty="0"/>
+              <a:t> uyup uymadığı kontrol edilebilir. Eğer XML, </a:t>
+            </a:r>
+            <a:r>
+              <a:rPr lang="tr-TR" dirty="0" err="1"/>
+              <a:t>DTD'ye</a:t>
+            </a:r>
+            <a:r>
+              <a:rPr lang="tr-TR" dirty="0"/>
+              <a:t> uygunsa, XML geçerli (</a:t>
+            </a:r>
+            <a:r>
+              <a:rPr lang="tr-TR" dirty="0" err="1"/>
+              <a:t>valid</a:t>
+            </a:r>
+            <a:r>
+              <a:rPr lang="tr-TR" dirty="0"/>
+              <a:t>) olarak adlandırılır.</a:t>
+            </a:r>
+          </a:p>
+          <a:p>
+            <a:pPr marL="0" indent="0">
+              <a:buNone/>
+            </a:pPr>
+            <a:endParaRPr lang="tr-TR" dirty="0"/>
+          </a:p>
+          <a:p>
+            <a:pPr marL="0" indent="0">
+              <a:buNone/>
+            </a:pPr>
+            <a:endParaRPr lang="tr-TR" dirty="0"/>
+          </a:p>
+          <a:p>
+            <a:pPr marL="0" indent="0">
+              <a:buNone/>
+            </a:pPr>
+            <a:endParaRPr lang="tr-TR" dirty="0"/>
           </a:p>
         </p:txBody>
       </p:sp>
     </p:spTree>
     <p:extLst>
       <p:ext uri="{BB962C8B-B14F-4D97-AF65-F5344CB8AC3E}">
-        <p14:creationId xmlns:p14="http://schemas.microsoft.com/office/powerpoint/2010/main" val="1566858748"/>
+        <p14:creationId xmlns:p14="http://schemas.microsoft.com/office/powerpoint/2010/main" val="1520125017"/>
       </p:ext>
     </p:extLst>
   </p:cSld>
@@ -4501,7 +4240,7 @@
           <p:cNvPr id="2" name="Title 1">
             <a:extLst>
               <a:ext uri="{FF2B5EF4-FFF2-40B4-BE49-F238E27FC236}">
-                <a16:creationId xmlns:a16="http://schemas.microsoft.com/office/drawing/2014/main" id="{2E2D751F-B02E-3E2A-2F45-FDFAFCE8D00D}"/>
+                <a16:creationId xmlns:a16="http://schemas.microsoft.com/office/drawing/2014/main" id="{AF7CC078-3E4E-EC48-2762-E02581A2780C}"/>
               </a:ext>
             </a:extLst>
           </p:cNvPr>
@@ -4519,7 +4258,7 @@
           <a:p>
             <a:r>
               <a:rPr lang="tr-TR" dirty="0"/>
-              <a:t>XML Şeması (XSD)</a:t>
+              <a:t>XML DTD</a:t>
             </a:r>
           </a:p>
         </p:txBody>
@@ -4529,7 +4268,7 @@
           <p:cNvPr id="3" name="Content Placeholder 2">
             <a:extLst>
               <a:ext uri="{FF2B5EF4-FFF2-40B4-BE49-F238E27FC236}">
-                <a16:creationId xmlns:a16="http://schemas.microsoft.com/office/drawing/2014/main" id="{DFD8D7A2-6829-0FB7-00F3-63141498B311}"/>
+                <a16:creationId xmlns:a16="http://schemas.microsoft.com/office/drawing/2014/main" id="{98F24730-707F-376F-ECFB-FC9FDA7113D1}"/>
               </a:ext>
             </a:extLst>
           </p:cNvPr>
@@ -4543,49 +4282,245 @@
         <p:spPr/>
         <p:txBody>
           <a:bodyPr>
-            <a:normAutofit lnSpcReduction="10000"/>
+            <a:normAutofit fontScale="55000" lnSpcReduction="20000"/>
           </a:bodyPr>
           <a:lstStyle/>
           <a:p>
-            <a:r>
-              <a:rPr lang="tr-TR" dirty="0"/>
-              <a:t>Bir XML Şeması, tıpkı bir DTD gibi bir XML belgesinin yapısını tanımlar.</a:t>
-            </a:r>
-          </a:p>
-          <a:p>
+            <a:pPr marL="0" indent="0">
+              <a:buNone/>
+            </a:pPr>
+            <a:r>
+              <a:rPr lang="en-US" b="0" i="0" u="none" strike="noStrike" dirty="0">
+                <a:solidFill>
+                  <a:srgbClr val="0000CD"/>
+                </a:solidFill>
+                <a:effectLst/>
+                <a:latin typeface="Consolas" panose="020B0609020204030204" pitchFamily="49" charset="0"/>
+              </a:rPr>
+              <a:t>&lt;?xml version="1.0"?&gt;</a:t>
+            </a:r>
+          </a:p>
+          <a:p>
+            <a:pPr marL="0" indent="0">
+              <a:buNone/>
+            </a:pPr>
+            <a:r>
+              <a:rPr lang="en-US" b="0" i="0" u="none" strike="noStrike" dirty="0">
+                <a:solidFill>
+                  <a:srgbClr val="0000CD"/>
+                </a:solidFill>
+                <a:effectLst/>
+                <a:latin typeface="Consolas" panose="020B0609020204030204" pitchFamily="49" charset="0"/>
+              </a:rPr>
+              <a:t>&lt;!DOCTYPE note [</a:t>
+            </a:r>
+          </a:p>
+          <a:p>
+            <a:pPr marL="0" indent="0">
+              <a:buNone/>
+            </a:pPr>
+            <a:r>
+              <a:rPr lang="en-US" b="0" i="0" u="none" strike="noStrike" dirty="0">
+                <a:solidFill>
+                  <a:srgbClr val="0000CD"/>
+                </a:solidFill>
+                <a:effectLst/>
+                <a:latin typeface="Consolas" panose="020B0609020204030204" pitchFamily="49" charset="0"/>
+              </a:rPr>
+              <a:t>  &lt;!ELEMENT note    (to, from, heading, body)&gt;</a:t>
+            </a:r>
+          </a:p>
+          <a:p>
+            <a:pPr marL="0" indent="0">
+              <a:buNone/>
+            </a:pPr>
+            <a:r>
+              <a:rPr lang="en-US" b="0" i="0" u="none" strike="noStrike" dirty="0">
+                <a:solidFill>
+                  <a:srgbClr val="0000CD"/>
+                </a:solidFill>
+                <a:effectLst/>
+                <a:latin typeface="Consolas" panose="020B0609020204030204" pitchFamily="49" charset="0"/>
+              </a:rPr>
+              <a:t>  &lt;!ELEMENT to      (#PCDATA)&gt;</a:t>
+            </a:r>
+          </a:p>
+          <a:p>
+            <a:pPr marL="0" indent="0">
+              <a:buNone/>
+            </a:pPr>
+            <a:r>
+              <a:rPr lang="en-US" b="0" i="0" u="none" strike="noStrike" dirty="0">
+                <a:solidFill>
+                  <a:srgbClr val="0000CD"/>
+                </a:solidFill>
+                <a:effectLst/>
+                <a:latin typeface="Consolas" panose="020B0609020204030204" pitchFamily="49" charset="0"/>
+              </a:rPr>
+              <a:t>  &lt;!ELEMENT from    (#PCDATA)&gt;</a:t>
+            </a:r>
+          </a:p>
+          <a:p>
+            <a:pPr marL="0" indent="0">
+              <a:buNone/>
+            </a:pPr>
+            <a:r>
+              <a:rPr lang="en-US" b="0" i="0" u="none" strike="noStrike" dirty="0">
+                <a:solidFill>
+                  <a:srgbClr val="0000CD"/>
+                </a:solidFill>
+                <a:effectLst/>
+                <a:latin typeface="Consolas" panose="020B0609020204030204" pitchFamily="49" charset="0"/>
+              </a:rPr>
+              <a:t>  &lt;!ELEMENT heading (#PCDATA)&gt;</a:t>
+            </a:r>
+          </a:p>
+          <a:p>
+            <a:pPr marL="0" indent="0">
+              <a:buNone/>
+            </a:pPr>
+            <a:r>
+              <a:rPr lang="en-US" b="0" i="0" u="none" strike="noStrike" dirty="0">
+                <a:solidFill>
+                  <a:srgbClr val="0000CD"/>
+                </a:solidFill>
+                <a:effectLst/>
+                <a:latin typeface="Consolas" panose="020B0609020204030204" pitchFamily="49" charset="0"/>
+              </a:rPr>
+              <a:t>  &lt;!ELEMENT body    (#PCDATA)&gt;</a:t>
+            </a:r>
+          </a:p>
+          <a:p>
+            <a:pPr marL="0" indent="0">
+              <a:buNone/>
+            </a:pPr>
+            <a:r>
+              <a:rPr lang="en-US" b="0" i="0" u="none" strike="noStrike" dirty="0">
+                <a:solidFill>
+                  <a:srgbClr val="0000CD"/>
+                </a:solidFill>
+                <a:effectLst/>
+                <a:latin typeface="Consolas" panose="020B0609020204030204" pitchFamily="49" charset="0"/>
+              </a:rPr>
+              <a:t>]&gt;</a:t>
+            </a:r>
+          </a:p>
+          <a:p>
+            <a:pPr marL="0" indent="0">
+              <a:buNone/>
+            </a:pPr>
+            <a:r>
+              <a:rPr lang="en-US" b="0" i="0" u="none" strike="noStrike" dirty="0">
+                <a:solidFill>
+                  <a:srgbClr val="0000CD"/>
+                </a:solidFill>
+                <a:effectLst/>
+                <a:latin typeface="Consolas" panose="020B0609020204030204" pitchFamily="49" charset="0"/>
+              </a:rPr>
+              <a:t>&lt;note&gt;</a:t>
+            </a:r>
+          </a:p>
+          <a:p>
+            <a:pPr marL="0" indent="0">
+              <a:buNone/>
+            </a:pPr>
+            <a:r>
+              <a:rPr lang="en-US" b="0" i="0" u="none" strike="noStrike" dirty="0">
+                <a:solidFill>
+                  <a:srgbClr val="0000CD"/>
+                </a:solidFill>
+                <a:effectLst/>
+                <a:latin typeface="Consolas" panose="020B0609020204030204" pitchFamily="49" charset="0"/>
+              </a:rPr>
+              <a:t>  &lt;to&gt;</a:t>
+            </a:r>
+            <a:r>
+              <a:rPr lang="en-US" b="0" i="0" u="none" strike="noStrike" dirty="0" err="1">
+                <a:solidFill>
+                  <a:srgbClr val="0000CD"/>
+                </a:solidFill>
+                <a:effectLst/>
+                <a:latin typeface="Consolas" panose="020B0609020204030204" pitchFamily="49" charset="0"/>
+              </a:rPr>
+              <a:t>Tove</a:t>
+            </a:r>
+            <a:r>
+              <a:rPr lang="en-US" b="0" i="0" u="none" strike="noStrike" dirty="0">
+                <a:solidFill>
+                  <a:srgbClr val="0000CD"/>
+                </a:solidFill>
+                <a:effectLst/>
+                <a:latin typeface="Consolas" panose="020B0609020204030204" pitchFamily="49" charset="0"/>
+              </a:rPr>
+              <a:t>&lt;/to&gt;</a:t>
+            </a:r>
+          </a:p>
+          <a:p>
+            <a:pPr marL="0" indent="0">
+              <a:buNone/>
+            </a:pPr>
+            <a:r>
+              <a:rPr lang="en-US" b="0" i="0" u="none" strike="noStrike" dirty="0">
+                <a:solidFill>
+                  <a:srgbClr val="0000CD"/>
+                </a:solidFill>
+                <a:effectLst/>
+                <a:latin typeface="Consolas" panose="020B0609020204030204" pitchFamily="49" charset="0"/>
+              </a:rPr>
+              <a:t>  &lt;from&gt;Jani&lt;/from&gt;</a:t>
+            </a:r>
+          </a:p>
+          <a:p>
+            <a:pPr marL="0" indent="0">
+              <a:buNone/>
+            </a:pPr>
+            <a:r>
+              <a:rPr lang="en-US" b="0" i="0" u="none" strike="noStrike" dirty="0">
+                <a:solidFill>
+                  <a:srgbClr val="0000CD"/>
+                </a:solidFill>
+                <a:effectLst/>
+                <a:latin typeface="Consolas" panose="020B0609020204030204" pitchFamily="49" charset="0"/>
+              </a:rPr>
+              <a:t>  &lt;heading&gt;Reminder&lt;/heading&gt;</a:t>
+            </a:r>
+          </a:p>
+          <a:p>
+            <a:pPr marL="0" indent="0">
+              <a:buNone/>
+            </a:pPr>
+            <a:r>
+              <a:rPr lang="en-US" b="0" i="0" u="none" strike="noStrike" dirty="0">
+                <a:solidFill>
+                  <a:srgbClr val="0000CD"/>
+                </a:solidFill>
+                <a:effectLst/>
+                <a:latin typeface="Consolas" panose="020B0609020204030204" pitchFamily="49" charset="0"/>
+              </a:rPr>
+              <a:t>  &lt;body&gt;Don't forget me this weekend!&lt;/body&gt;</a:t>
+            </a:r>
+          </a:p>
+          <a:p>
+            <a:pPr marL="0" indent="0">
+              <a:buNone/>
+            </a:pPr>
+            <a:r>
+              <a:rPr lang="en-US" b="0" i="0" u="none" strike="noStrike" dirty="0">
+                <a:solidFill>
+                  <a:srgbClr val="0000CD"/>
+                </a:solidFill>
+                <a:effectLst/>
+                <a:latin typeface="Consolas" panose="020B0609020204030204" pitchFamily="49" charset="0"/>
+              </a:rPr>
+              <a:t>&lt;/note&gt; </a:t>
+            </a:r>
             <a:endParaRPr lang="tr-TR" dirty="0"/>
           </a:p>
           <a:p>
-            <a:r>
-              <a:rPr lang="tr-TR" dirty="0"/>
-              <a:t>Doğru sözdizimine (sentaks) sahip bir XML belgesine "İyi Biçimlendirilmiş" denir.</a:t>
-            </a:r>
-          </a:p>
-          <a:p>
+            <a:pPr marL="0" indent="0">
+              <a:buNone/>
+            </a:pPr>
             <a:endParaRPr lang="tr-TR" dirty="0"/>
-          </a:p>
-          <a:p>
-            <a:r>
-              <a:rPr lang="tr-TR" dirty="0"/>
-              <a:t>Bir XML Şemasına göre doğrulanan bir XML belgesi hem "İyi Biçimlendirilmiş" hem de "Geçerlidir".</a:t>
-            </a:r>
-          </a:p>
-          <a:p>
-            <a:endParaRPr lang="tr-TR" dirty="0"/>
-          </a:p>
-          <a:p>
-            <a:r>
-              <a:rPr lang="tr-TR" dirty="0"/>
-              <a:t>XML Şeması, </a:t>
-            </a:r>
-            <a:r>
-              <a:rPr lang="tr-TR" dirty="0" err="1"/>
-              <a:t>DTD'ye</a:t>
-            </a:r>
-            <a:r>
-              <a:rPr lang="tr-TR" dirty="0"/>
-              <a:t> XML tabanlı bir alternatiftir.</a:t>
-            </a:r>
           </a:p>
         </p:txBody>
       </p:sp>
@@ -4594,7 +4529,7 @@
           <p:cNvPr id="4" name="TextBox 3">
             <a:extLst>
               <a:ext uri="{FF2B5EF4-FFF2-40B4-BE49-F238E27FC236}">
-                <a16:creationId xmlns:a16="http://schemas.microsoft.com/office/drawing/2014/main" id="{5F979720-6924-0514-A193-014750BC0C1C}"/>
+                <a16:creationId xmlns:a16="http://schemas.microsoft.com/office/drawing/2014/main" id="{8D65BDE3-391D-84E5-CC93-9308F3FBB03A}"/>
               </a:ext>
             </a:extLst>
           </p:cNvPr>
@@ -4603,8 +4538,8 @@
         </p:nvSpPr>
         <p:spPr>
           <a:xfrm>
-            <a:off x="628650" y="6192837"/>
-            <a:ext cx="4945328" cy="369332"/>
+            <a:off x="628650" y="6311899"/>
+            <a:ext cx="5106847" cy="369332"/>
           </a:xfrm>
           <a:prstGeom prst="rect">
             <a:avLst/>
@@ -4635,7 +4570,7 @@
             </a:r>
             <a:r>
               <a:rPr lang="tr-TR" dirty="0" err="1"/>
-              <a:t>xml_schema.asp</a:t>
+              <a:t>xml_dtd_intro.asp</a:t>
             </a:r>
             <a:endParaRPr lang="tr-TR" dirty="0"/>
           </a:p>
@@ -4644,7 +4579,7 @@
     </p:spTree>
     <p:extLst>
       <p:ext uri="{BB962C8B-B14F-4D97-AF65-F5344CB8AC3E}">
-        <p14:creationId xmlns:p14="http://schemas.microsoft.com/office/powerpoint/2010/main" val="1045859140"/>
+        <p14:creationId xmlns:p14="http://schemas.microsoft.com/office/powerpoint/2010/main" val="715129201"/>
       </p:ext>
     </p:extLst>
   </p:cSld>
@@ -4676,6 +4611,267 @@
           <p:cNvPr id="2" name="Title 1">
             <a:extLst>
               <a:ext uri="{FF2B5EF4-FFF2-40B4-BE49-F238E27FC236}">
+                <a16:creationId xmlns:a16="http://schemas.microsoft.com/office/drawing/2014/main" id="{8FFD4E0D-BF44-B94D-3CCA-99CA96624D6C}"/>
+              </a:ext>
+            </a:extLst>
+          </p:cNvPr>
+          <p:cNvSpPr>
+            <a:spLocks noGrp="1"/>
+          </p:cNvSpPr>
+          <p:nvPr>
+            <p:ph type="title"/>
+          </p:nvPr>
+        </p:nvSpPr>
+        <p:spPr/>
+        <p:txBody>
+          <a:bodyPr/>
+          <a:lstStyle/>
+          <a:p>
+            <a:r>
+              <a:rPr lang="tr-TR" dirty="0"/>
+              <a:t>XML DTD</a:t>
+            </a:r>
+          </a:p>
+        </p:txBody>
+      </p:sp>
+      <p:sp>
+        <p:nvSpPr>
+          <p:cNvPr id="3" name="Content Placeholder 2">
+            <a:extLst>
+              <a:ext uri="{FF2B5EF4-FFF2-40B4-BE49-F238E27FC236}">
+                <a16:creationId xmlns:a16="http://schemas.microsoft.com/office/drawing/2014/main" id="{E1CC99E5-AE24-A4C9-3EE4-FF13D2A8F11F}"/>
+              </a:ext>
+            </a:extLst>
+          </p:cNvPr>
+          <p:cNvSpPr>
+            <a:spLocks noGrp="1"/>
+          </p:cNvSpPr>
+          <p:nvPr>
+            <p:ph idx="1"/>
+          </p:nvPr>
+        </p:nvSpPr>
+        <p:spPr/>
+        <p:txBody>
+          <a:bodyPr/>
+          <a:lstStyle/>
+          <a:p>
+            <a:r>
+              <a:rPr lang="tr-TR" dirty="0"/>
+              <a:t>Uygulama</a:t>
+            </a:r>
+          </a:p>
+        </p:txBody>
+      </p:sp>
+    </p:spTree>
+    <p:extLst>
+      <p:ext uri="{BB962C8B-B14F-4D97-AF65-F5344CB8AC3E}">
+        <p14:creationId xmlns:p14="http://schemas.microsoft.com/office/powerpoint/2010/main" val="1566858748"/>
+      </p:ext>
+    </p:extLst>
+  </p:cSld>
+  <p:clrMapOvr>
+    <a:masterClrMapping/>
+  </p:clrMapOvr>
+</p:sld>
+</file>
+
+<file path=ppt/slides/slide17.xml><?xml version="1.0" encoding="utf-8"?>
+<p:sld xmlns:a="http://schemas.openxmlformats.org/drawingml/2006/main" xmlns:r="http://schemas.openxmlformats.org/officeDocument/2006/relationships" xmlns:p="http://schemas.openxmlformats.org/presentationml/2006/main">
+  <p:cSld>
+    <p:spTree>
+      <p:nvGrpSpPr>
+        <p:cNvPr id="1" name=""/>
+        <p:cNvGrpSpPr/>
+        <p:nvPr/>
+      </p:nvGrpSpPr>
+      <p:grpSpPr>
+        <a:xfrm>
+          <a:off x="0" y="0"/>
+          <a:ext cx="0" cy="0"/>
+          <a:chOff x="0" y="0"/>
+          <a:chExt cx="0" cy="0"/>
+        </a:xfrm>
+      </p:grpSpPr>
+      <p:sp>
+        <p:nvSpPr>
+          <p:cNvPr id="2" name="Title 1">
+            <a:extLst>
+              <a:ext uri="{FF2B5EF4-FFF2-40B4-BE49-F238E27FC236}">
+                <a16:creationId xmlns:a16="http://schemas.microsoft.com/office/drawing/2014/main" id="{2E2D751F-B02E-3E2A-2F45-FDFAFCE8D00D}"/>
+              </a:ext>
+            </a:extLst>
+          </p:cNvPr>
+          <p:cNvSpPr>
+            <a:spLocks noGrp="1"/>
+          </p:cNvSpPr>
+          <p:nvPr>
+            <p:ph type="title"/>
+          </p:nvPr>
+        </p:nvSpPr>
+        <p:spPr/>
+        <p:txBody>
+          <a:bodyPr/>
+          <a:lstStyle/>
+          <a:p>
+            <a:r>
+              <a:rPr lang="tr-TR" dirty="0"/>
+              <a:t>XML Şeması (XSD)</a:t>
+            </a:r>
+          </a:p>
+        </p:txBody>
+      </p:sp>
+      <p:sp>
+        <p:nvSpPr>
+          <p:cNvPr id="3" name="Content Placeholder 2">
+            <a:extLst>
+              <a:ext uri="{FF2B5EF4-FFF2-40B4-BE49-F238E27FC236}">
+                <a16:creationId xmlns:a16="http://schemas.microsoft.com/office/drawing/2014/main" id="{DFD8D7A2-6829-0FB7-00F3-63141498B311}"/>
+              </a:ext>
+            </a:extLst>
+          </p:cNvPr>
+          <p:cNvSpPr>
+            <a:spLocks noGrp="1"/>
+          </p:cNvSpPr>
+          <p:nvPr>
+            <p:ph idx="1"/>
+          </p:nvPr>
+        </p:nvSpPr>
+        <p:spPr/>
+        <p:txBody>
+          <a:bodyPr>
+            <a:normAutofit lnSpcReduction="10000"/>
+          </a:bodyPr>
+          <a:lstStyle/>
+          <a:p>
+            <a:r>
+              <a:rPr lang="tr-TR" dirty="0"/>
+              <a:t>Bir XML Şeması, tıpkı bir DTD gibi bir XML belgesinin yapısını tanımlar.</a:t>
+            </a:r>
+          </a:p>
+          <a:p>
+            <a:endParaRPr lang="tr-TR" dirty="0"/>
+          </a:p>
+          <a:p>
+            <a:r>
+              <a:rPr lang="tr-TR" dirty="0"/>
+              <a:t>Doğru sözdizimine (sentaks) sahip bir XML belgesine "İyi Biçimlendirilmiş" denir.</a:t>
+            </a:r>
+          </a:p>
+          <a:p>
+            <a:endParaRPr lang="tr-TR" dirty="0"/>
+          </a:p>
+          <a:p>
+            <a:r>
+              <a:rPr lang="tr-TR" dirty="0"/>
+              <a:t>Bir XML Şemasına göre doğrulanan bir XML belgesi hem "İyi Biçimlendirilmiş" hem de "Geçerlidir".</a:t>
+            </a:r>
+          </a:p>
+          <a:p>
+            <a:endParaRPr lang="tr-TR" dirty="0"/>
+          </a:p>
+          <a:p>
+            <a:r>
+              <a:rPr lang="tr-TR" dirty="0"/>
+              <a:t>XML Şeması, </a:t>
+            </a:r>
+            <a:r>
+              <a:rPr lang="tr-TR" dirty="0" err="1"/>
+              <a:t>DTD'ye</a:t>
+            </a:r>
+            <a:r>
+              <a:rPr lang="tr-TR" dirty="0"/>
+              <a:t> XML tabanlı bir alternatiftir.</a:t>
+            </a:r>
+          </a:p>
+        </p:txBody>
+      </p:sp>
+      <p:sp>
+        <p:nvSpPr>
+          <p:cNvPr id="4" name="TextBox 3">
+            <a:extLst>
+              <a:ext uri="{FF2B5EF4-FFF2-40B4-BE49-F238E27FC236}">
+                <a16:creationId xmlns:a16="http://schemas.microsoft.com/office/drawing/2014/main" id="{5F979720-6924-0514-A193-014750BC0C1C}"/>
+              </a:ext>
+            </a:extLst>
+          </p:cNvPr>
+          <p:cNvSpPr txBox="1"/>
+          <p:nvPr/>
+        </p:nvSpPr>
+        <p:spPr>
+          <a:xfrm>
+            <a:off x="628650" y="6192837"/>
+            <a:ext cx="4945328" cy="369332"/>
+          </a:xfrm>
+          <a:prstGeom prst="rect">
+            <a:avLst/>
+          </a:prstGeom>
+          <a:noFill/>
+        </p:spPr>
+        <p:txBody>
+          <a:bodyPr wrap="none" rtlCol="0">
+            <a:spAutoFit/>
+          </a:bodyPr>
+          <a:lstStyle/>
+          <a:p>
+            <a:r>
+              <a:rPr lang="tr-TR" dirty="0" err="1"/>
+              <a:t>https</a:t>
+            </a:r>
+            <a:r>
+              <a:rPr lang="tr-TR" dirty="0"/>
+              <a:t>://www.w3schools.com/</a:t>
+            </a:r>
+            <a:r>
+              <a:rPr lang="tr-TR" dirty="0" err="1"/>
+              <a:t>xml</a:t>
+            </a:r>
+            <a:r>
+              <a:rPr lang="tr-TR" dirty="0"/>
+              <a:t>/</a:t>
+            </a:r>
+            <a:r>
+              <a:rPr lang="tr-TR" dirty="0" err="1"/>
+              <a:t>xml_schema.asp</a:t>
+            </a:r>
+            <a:endParaRPr lang="tr-TR" dirty="0"/>
+          </a:p>
+        </p:txBody>
+      </p:sp>
+    </p:spTree>
+    <p:extLst>
+      <p:ext uri="{BB962C8B-B14F-4D97-AF65-F5344CB8AC3E}">
+        <p14:creationId xmlns:p14="http://schemas.microsoft.com/office/powerpoint/2010/main" val="1045859140"/>
+      </p:ext>
+    </p:extLst>
+  </p:cSld>
+  <p:clrMapOvr>
+    <a:masterClrMapping/>
+  </p:clrMapOvr>
+</p:sld>
+</file>
+
+<file path=ppt/slides/slide18.xml><?xml version="1.0" encoding="utf-8"?>
+<p:sld xmlns:a="http://schemas.openxmlformats.org/drawingml/2006/main" xmlns:r="http://schemas.openxmlformats.org/officeDocument/2006/relationships" xmlns:p="http://schemas.openxmlformats.org/presentationml/2006/main">
+  <p:cSld>
+    <p:spTree>
+      <p:nvGrpSpPr>
+        <p:cNvPr id="1" name=""/>
+        <p:cNvGrpSpPr/>
+        <p:nvPr/>
+      </p:nvGrpSpPr>
+      <p:grpSpPr>
+        <a:xfrm>
+          <a:off x="0" y="0"/>
+          <a:ext cx="0" cy="0"/>
+          <a:chOff x="0" y="0"/>
+          <a:chExt cx="0" cy="0"/>
+        </a:xfrm>
+      </p:grpSpPr>
+      <p:sp>
+        <p:nvSpPr>
+          <p:cNvPr id="2" name="Title 1">
+            <a:extLst>
+              <a:ext uri="{FF2B5EF4-FFF2-40B4-BE49-F238E27FC236}">
                 <a16:creationId xmlns:a16="http://schemas.microsoft.com/office/drawing/2014/main" id="{2E2D751F-B02E-3E2A-2F45-FDFAFCE8D00D}"/>
               </a:ext>
             </a:extLst>
@@ -5455,7 +5651,7 @@
 </p:sld>
 </file>
 
-<file path=ppt/slides/slide17.xml><?xml version="1.0" encoding="utf-8"?>
+<file path=ppt/slides/slide19.xml><?xml version="1.0" encoding="utf-8"?>
 <p:sld xmlns:a="http://schemas.openxmlformats.org/drawingml/2006/main" xmlns:r="http://schemas.openxmlformats.org/officeDocument/2006/relationships" xmlns:p="http://schemas.openxmlformats.org/presentationml/2006/main">
   <p:cSld>
     <p:spTree>
@@ -5729,7 +5925,7 @@
           <a:p>
             <a:r>
               <a:rPr lang="tr-TR" dirty="0"/>
-              <a:t>Genişletilebilir İşaretleme Dili (XML), yapılandırılmış bilgileri temsil eden basit bir metin tabanlı biçimdir: belgeler, veriler, yapılandırma, kitaplar, işlemler, faturalar ve çok daha fazlası.</a:t>
+              <a:t>Genişletilebilir İşaretleme Dili (XML), yapılandırılmış bilgileri temsil eden basit bir metin tabanlı biçimdir: belgeler, veriler, yapılandırma, kitaplar, işlemler, faturalar, ...</a:t>
             </a:r>
           </a:p>
           <a:p>
@@ -6275,15 +6471,15 @@
           <a:lstStyle/>
           <a:p>
             <a:r>
-              <a:rPr lang="tr-TR" sz="4000" dirty="0"/>
-              <a:t>XML Özellikleri (</a:t>
-            </a:r>
-            <a:r>
-              <a:rPr lang="tr-TR" sz="4000" dirty="0" err="1"/>
+              <a:rPr lang="tr-TR" sz="3600" dirty="0"/>
+              <a:t>XML Özellikleri - Nitelikleri (</a:t>
+            </a:r>
+            <a:r>
+              <a:rPr lang="tr-TR" sz="3600" dirty="0" err="1"/>
               <a:t>Attributes</a:t>
             </a:r>
             <a:r>
-              <a:rPr lang="tr-TR" sz="4000" dirty="0"/>
+              <a:rPr lang="tr-TR" sz="3600" dirty="0"/>
               <a:t>)</a:t>
             </a:r>
           </a:p>
@@ -7845,6 +8041,9 @@
           </a:bodyPr>
           <a:lstStyle/>
           <a:p>
+            <a:pPr marL="0" indent="0">
+              <a:buNone/>
+            </a:pPr>
             <a:r>
               <a:rPr lang="tr-TR" dirty="0"/>
               <a:t>XML elemanları şu adlandırma kurallarına uymalıdır:</a:t>
@@ -8073,7 +8272,7 @@
           <p:cNvPr id="2" name="Title 1">
             <a:extLst>
               <a:ext uri="{FF2B5EF4-FFF2-40B4-BE49-F238E27FC236}">
-                <a16:creationId xmlns:a16="http://schemas.microsoft.com/office/drawing/2014/main" id="{B64F1977-FBB6-E6DB-C2B4-5F7AEEEC6842}"/>
+                <a16:creationId xmlns:a16="http://schemas.microsoft.com/office/drawing/2014/main" id="{1A584240-E65B-96E4-FFBC-83121564EA26}"/>
               </a:ext>
             </a:extLst>
           </p:cNvPr>
@@ -8091,11 +8290,7 @@
           <a:p>
             <a:r>
               <a:rPr lang="tr-TR" dirty="0"/>
-              <a:t>XML Ayrıştırıcı (</a:t>
-            </a:r>
-            <a:r>
-              <a:rPr lang="tr-TR"/>
-              <a:t>Parser)</a:t>
+              <a:t>XML Uygulama</a:t>
             </a:r>
           </a:p>
         </p:txBody>
@@ -8105,7 +8300,7 @@
           <p:cNvPr id="3" name="Content Placeholder 2">
             <a:extLst>
               <a:ext uri="{FF2B5EF4-FFF2-40B4-BE49-F238E27FC236}">
-                <a16:creationId xmlns:a16="http://schemas.microsoft.com/office/drawing/2014/main" id="{0AB76B48-969D-C750-C5B8-8CEF6B5E9745}"/>
+                <a16:creationId xmlns:a16="http://schemas.microsoft.com/office/drawing/2014/main" id="{33DD6765-030D-9AC6-7A9C-20DD5F1FCC85}"/>
               </a:ext>
             </a:extLst>
           </p:cNvPr>
@@ -8116,84 +8311,77 @@
             <p:ph idx="1"/>
           </p:nvPr>
         </p:nvSpPr>
-        <p:spPr/>
+        <p:spPr>
+          <a:xfrm>
+            <a:off x="628650" y="1825625"/>
+            <a:ext cx="3584121" cy="1015546"/>
+          </a:xfrm>
+        </p:spPr>
         <p:txBody>
           <a:bodyPr>
-            <a:normAutofit fontScale="70000" lnSpcReduction="20000"/>
+            <a:normAutofit/>
           </a:bodyPr>
           <a:lstStyle/>
           <a:p>
             <a:r>
-              <a:rPr lang="tr-TR" dirty="0"/>
-              <a:t>XML DOM (</a:t>
-            </a:r>
-            <a:r>
-              <a:rPr lang="tr-TR" dirty="0" err="1"/>
-              <a:t>Document</a:t>
-            </a:r>
-            <a:r>
-              <a:rPr lang="tr-TR" dirty="0"/>
-              <a:t> Object Model - Belge Nesne Modeli), </a:t>
-            </a:r>
-            <a:r>
-              <a:rPr lang="tr-TR" dirty="0" err="1"/>
-              <a:t>XML'e</a:t>
-            </a:r>
-            <a:r>
-              <a:rPr lang="tr-TR" dirty="0"/>
-              <a:t> erişmek ve </a:t>
-            </a:r>
-            <a:r>
-              <a:rPr lang="tr-TR" dirty="0" err="1"/>
-              <a:t>XML'i</a:t>
-            </a:r>
-            <a:r>
-              <a:rPr lang="tr-TR" dirty="0"/>
-              <a:t> düzenlemek için özellikleri ve yöntemleri tanımlar.</a:t>
-            </a:r>
-          </a:p>
-          <a:p>
-            <a:endParaRPr lang="tr-TR" dirty="0"/>
-          </a:p>
-          <a:p>
-            <a:r>
-              <a:rPr lang="tr-TR" dirty="0"/>
-              <a:t>Bir XML dokümanına erişilebilmesi için işlenecek dosyanın önce bir XML DOM nesnesine yüklenmesi gerekir.</a:t>
-            </a:r>
-          </a:p>
-          <a:p>
-            <a:endParaRPr lang="tr-TR" dirty="0"/>
-          </a:p>
-          <a:p>
-            <a:r>
-              <a:rPr lang="tr-TR" dirty="0"/>
-              <a:t>XML DOM ile bir XML dokümanı bir ağaç şeklinde ifade edilebilecek hale dönüştürülür.</a:t>
-            </a:r>
-          </a:p>
-          <a:p>
-            <a:endParaRPr lang="tr-TR" dirty="0"/>
-          </a:p>
-          <a:p>
-            <a:r>
-              <a:rPr lang="tr-TR" dirty="0"/>
-              <a:t>XML DOM, XML öğelerinin nasıl alınacağına, değiştirileceğine, ekleneceğine veya silineceğine ilişkin bir standarttır.</a:t>
-            </a:r>
-          </a:p>
-          <a:p>
-            <a:endParaRPr lang="tr-TR" dirty="0"/>
-          </a:p>
-          <a:p>
-            <a:r>
-              <a:rPr lang="tr-TR" dirty="0"/>
-              <a:t>JavaScript ile örnek uygulama.</a:t>
-            </a:r>
+              <a:rPr lang="tr-TR" sz="1400" dirty="0"/>
+              <a:t>Paylaşım çeşitleri: - yazı - resim</a:t>
+            </a:r>
+          </a:p>
+          <a:p>
+            <a:r>
+              <a:rPr lang="tr-TR" sz="1400" dirty="0"/>
+              <a:t>Yazı: tarih, beğeni sayısı, alıntı sayısı, metin</a:t>
+            </a:r>
+          </a:p>
+          <a:p>
+            <a:r>
+              <a:rPr lang="tr-TR" sz="1400" dirty="0"/>
+              <a:t>Resim: tarih, resmin adresi, beğeni sayısı</a:t>
+            </a:r>
+          </a:p>
+        </p:txBody>
+      </p:sp>
+      <p:sp>
+        <p:nvSpPr>
+          <p:cNvPr id="4" name="TextBox 3">
+            <a:extLst>
+              <a:ext uri="{FF2B5EF4-FFF2-40B4-BE49-F238E27FC236}">
+                <a16:creationId xmlns:a16="http://schemas.microsoft.com/office/drawing/2014/main" id="{6633CD78-3239-3633-70D1-DC2FC12B32DA}"/>
+              </a:ext>
+            </a:extLst>
+          </p:cNvPr>
+          <p:cNvSpPr txBox="1"/>
+          <p:nvPr/>
+        </p:nvSpPr>
+        <p:spPr>
+          <a:xfrm>
+            <a:off x="4212771" y="1825625"/>
+            <a:ext cx="4302579" cy="369332"/>
+          </a:xfrm>
+          <a:prstGeom prst="rect">
+            <a:avLst/>
+          </a:prstGeom>
+          <a:noFill/>
+        </p:spPr>
+        <p:txBody>
+          <a:bodyPr wrap="square" rtlCol="0">
+            <a:spAutoFit/>
+          </a:bodyPr>
+          <a:lstStyle/>
+          <a:p>
+            <a:r>
+              <a:rPr lang="en-US" dirty="0" err="1"/>
+              <a:t>içerik</a:t>
+            </a:r>
+            <a:endParaRPr lang="en-US" dirty="0"/>
           </a:p>
         </p:txBody>
       </p:sp>
     </p:spTree>
     <p:extLst>
       <p:ext uri="{BB962C8B-B14F-4D97-AF65-F5344CB8AC3E}">
-        <p14:creationId xmlns:p14="http://schemas.microsoft.com/office/powerpoint/2010/main" val="2174812847"/>
+        <p14:creationId xmlns:p14="http://schemas.microsoft.com/office/powerpoint/2010/main" val="120669182"/>
       </p:ext>
     </p:extLst>
   </p:cSld>

</xml_diff>